<commit_message>
new tuts for bump/normal map
</commit_message>
<xml_diff>
--- a/threejs-tuts-3.pptx
+++ b/threejs-tuts-3.pptx
@@ -36,13 +36,16 @@
     <p:sldId id="373" r:id="rId30"/>
     <p:sldId id="394" r:id="rId31"/>
     <p:sldId id="395" r:id="rId32"/>
-    <p:sldId id="399" r:id="rId33"/>
-    <p:sldId id="400" r:id="rId34"/>
-    <p:sldId id="401" r:id="rId35"/>
-    <p:sldId id="396" r:id="rId36"/>
-    <p:sldId id="385" r:id="rId37"/>
-    <p:sldId id="379" r:id="rId38"/>
-    <p:sldId id="398" r:id="rId39"/>
+    <p:sldId id="396" r:id="rId33"/>
+    <p:sldId id="399" r:id="rId34"/>
+    <p:sldId id="400" r:id="rId35"/>
+    <p:sldId id="401" r:id="rId36"/>
+    <p:sldId id="402" r:id="rId37"/>
+    <p:sldId id="403" r:id="rId38"/>
+    <p:sldId id="404" r:id="rId39"/>
+    <p:sldId id="385" r:id="rId40"/>
+    <p:sldId id="379" r:id="rId41"/>
+    <p:sldId id="398" r:id="rId42"/>
   </p:sldIdLst>
   <p:sldSz cx="9144000" cy="6858000" type="screen4x3"/>
   <p:notesSz cx="6797675" cy="9928225"/>
@@ -6317,27 +6320,89 @@
           <a:lstStyle/>
           <a:p>
             <a:r>
+              <a:rPr lang="en-US" altLang="zh-TW" dirty="0" smtClean="0"/>
+              <a:t>Particle Suite (</a:t>
+            </a:r>
+            <a:r>
               <a:rPr lang="en-US" altLang="zh-TW" dirty="0" err="1" smtClean="0"/>
-              <a:t>Tuts</a:t>
-            </a:r>
-            <a:r>
-              <a:rPr lang="en-US" altLang="zh-TW" dirty="0" smtClean="0"/>
-              <a:t> 25: Fog</a:t>
+              <a:t>Stemkoski</a:t>
+            </a:r>
+            <a:r>
+              <a:rPr lang="en-US" altLang="zh-TW" dirty="0" smtClean="0"/>
+              <a:t>)</a:t>
             </a:r>
             <a:endParaRPr lang="zh-TW" altLang="en-US" dirty="0"/>
+          </a:p>
+        </p:txBody>
+      </p:sp>
+      <p:sp>
+        <p:nvSpPr>
+          <p:cNvPr id="3" name="內容版面配置區 2"/>
+          <p:cNvSpPr>
+            <a:spLocks noGrp="1"/>
+          </p:cNvSpPr>
+          <p:nvPr>
+            <p:ph idx="1"/>
+          </p:nvPr>
+        </p:nvSpPr>
+        <p:spPr/>
+        <p:txBody>
+          <a:bodyPr/>
+          <a:lstStyle/>
+          <a:p>
+            <a:r>
+              <a:rPr lang="en-US" altLang="zh-TW" dirty="0" smtClean="0"/>
+              <a:t>sprite,</a:t>
+            </a:r>
+          </a:p>
+          <a:p>
+            <a:r>
+              <a:rPr lang="en-US" altLang="zh-TW" dirty="0" smtClean="0"/>
+              <a:t>Dynamic attributes with </a:t>
+            </a:r>
+            <a:r>
+              <a:rPr lang="en-US" altLang="zh-TW" dirty="0" err="1" smtClean="0"/>
+              <a:t>shader</a:t>
+            </a:r>
+            <a:endParaRPr lang="en-US" altLang="zh-TW" dirty="0" smtClean="0"/>
+          </a:p>
+          <a:p>
+            <a:r>
+              <a:rPr lang="en-US" altLang="zh-TW" dirty="0" smtClean="0"/>
+              <a:t>Particle engine (smoke, fire, …)</a:t>
+            </a:r>
+          </a:p>
+          <a:p>
+            <a:pPr lvl="1"/>
+            <a:r>
+              <a:rPr lang="en-US" altLang="zh-TW" dirty="0" smtClean="0"/>
+              <a:t>Using </a:t>
+            </a:r>
+            <a:r>
+              <a:rPr lang="en-US" altLang="zh-TW" dirty="0" err="1" smtClean="0"/>
+              <a:t>THREE.PointCloud</a:t>
+            </a:r>
+            <a:endParaRPr lang="en-US" altLang="zh-TW" dirty="0" smtClean="0"/>
           </a:p>
         </p:txBody>
       </p:sp>
     </p:spTree>
     <p:extLst>
       <p:ext uri="{BB962C8B-B14F-4D97-AF65-F5344CB8AC3E}">
-        <p14:creationId xmlns:p14="http://schemas.microsoft.com/office/powerpoint/2010/main" val="4138659837"/>
+        <p14:creationId xmlns:p14="http://schemas.microsoft.com/office/powerpoint/2010/main" val="426848126"/>
       </p:ext>
     </p:extLst>
   </p:cSld>
   <p:clrMapOvr>
     <a:masterClrMapping/>
   </p:clrMapOvr>
+  <p:timing>
+    <p:tnLst>
+      <p:par>
+        <p:cTn id="1" dur="indefinite" restart="never" nodeType="tmRoot"/>
+      </p:par>
+    </p:tnLst>
+  </p:timing>
 </p:sld>
 </file>
 
@@ -6379,6 +6444,63 @@
             </a:r>
             <a:r>
               <a:rPr lang="en-US" altLang="zh-TW" dirty="0" smtClean="0"/>
+              <a:t> 25: Fog</a:t>
+            </a:r>
+            <a:endParaRPr lang="zh-TW" altLang="en-US" dirty="0"/>
+          </a:p>
+        </p:txBody>
+      </p:sp>
+    </p:spTree>
+    <p:extLst>
+      <p:ext uri="{BB962C8B-B14F-4D97-AF65-F5344CB8AC3E}">
+        <p14:creationId xmlns:p14="http://schemas.microsoft.com/office/powerpoint/2010/main" val="4138659837"/>
+      </p:ext>
+    </p:extLst>
+  </p:cSld>
+  <p:clrMapOvr>
+    <a:masterClrMapping/>
+  </p:clrMapOvr>
+</p:sld>
+</file>
+
+<file path=ppt/slides/slide34.xml><?xml version="1.0" encoding="utf-8"?>
+<p:sld xmlns:a="http://schemas.openxmlformats.org/drawingml/2006/main" xmlns:r="http://schemas.openxmlformats.org/officeDocument/2006/relationships" xmlns:p="http://schemas.openxmlformats.org/presentationml/2006/main">
+  <p:cSld>
+    <p:spTree>
+      <p:nvGrpSpPr>
+        <p:cNvPr id="1" name=""/>
+        <p:cNvGrpSpPr/>
+        <p:nvPr/>
+      </p:nvGrpSpPr>
+      <p:grpSpPr>
+        <a:xfrm>
+          <a:off x="0" y="0"/>
+          <a:ext cx="0" cy="0"/>
+          <a:chOff x="0" y="0"/>
+          <a:chExt cx="0" cy="0"/>
+        </a:xfrm>
+      </p:grpSpPr>
+      <p:sp>
+        <p:nvSpPr>
+          <p:cNvPr id="2" name="標題 1"/>
+          <p:cNvSpPr>
+            <a:spLocks noGrp="1"/>
+          </p:cNvSpPr>
+          <p:nvPr>
+            <p:ph type="title"/>
+          </p:nvPr>
+        </p:nvSpPr>
+        <p:spPr/>
+        <p:txBody>
+          <a:bodyPr/>
+          <a:lstStyle/>
+          <a:p>
+            <a:r>
+              <a:rPr lang="en-US" altLang="zh-TW" dirty="0" err="1" smtClean="0"/>
+              <a:t>Tuts</a:t>
+            </a:r>
+            <a:r>
+              <a:rPr lang="en-US" altLang="zh-TW" dirty="0" smtClean="0"/>
               <a:t> 26: Agent (</a:t>
             </a:r>
             <a:r>
@@ -6406,7 +6528,7 @@
 </p:sld>
 </file>
 
-<file path=ppt/slides/slide34.xml><?xml version="1.0" encoding="utf-8"?>
+<file path=ppt/slides/slide35.xml><?xml version="1.0" encoding="utf-8"?>
 <p:sld xmlns:a="http://schemas.openxmlformats.org/drawingml/2006/main" xmlns:r="http://schemas.openxmlformats.org/officeDocument/2006/relationships" xmlns:p="http://schemas.openxmlformats.org/presentationml/2006/main">
   <p:cSld>
     <p:spTree>
@@ -6513,7 +6635,7 @@
 </p:sld>
 </file>
 
-<file path=ppt/slides/slide35.xml><?xml version="1.0" encoding="utf-8"?>
+<file path=ppt/slides/slide36.xml><?xml version="1.0" encoding="utf-8"?>
 <p:sld xmlns:a="http://schemas.openxmlformats.org/drawingml/2006/main" xmlns:r="http://schemas.openxmlformats.org/officeDocument/2006/relationships" xmlns:p="http://schemas.openxmlformats.org/presentationml/2006/main">
   <p:cSld>
     <p:spTree>
@@ -6546,16 +6668,27 @@
           <a:lstStyle/>
           <a:p>
             <a:r>
-              <a:rPr lang="en-US" altLang="zh-TW" dirty="0" smtClean="0"/>
-              <a:t>Particle Suite (</a:t>
-            </a:r>
-            <a:r>
               <a:rPr lang="en-US" altLang="zh-TW" dirty="0" err="1" smtClean="0"/>
-              <a:t>Stemkoski</a:t>
-            </a:r>
-            <a:r>
-              <a:rPr lang="en-US" altLang="zh-TW" dirty="0" smtClean="0"/>
-              <a:t>)</a:t>
+              <a:t>Tuts</a:t>
+            </a:r>
+            <a:r>
+              <a:rPr lang="en-US" altLang="zh-TW" dirty="0" smtClean="0"/>
+              <a:t> 28 </a:t>
+            </a:r>
+            <a:br>
+              <a:rPr lang="en-US" altLang="zh-TW" dirty="0" smtClean="0"/>
+            </a:br>
+            <a:r>
+              <a:rPr lang="en-US" altLang="zh-TW" dirty="0" smtClean="0"/>
+              <a:t>Normal</a:t>
+            </a:r>
+            <a:r>
+              <a:rPr lang="zh-TW" altLang="en-US" dirty="0" smtClean="0"/>
+              <a:t> </a:t>
+            </a:r>
+            <a:r>
+              <a:rPr lang="en-US" altLang="zh-TW" dirty="0" smtClean="0"/>
+              <a:t>map</a:t>
             </a:r>
             <a:endParaRPr lang="zh-TW" altLang="en-US" dirty="0"/>
           </a:p>
@@ -6578,61 +6711,326 @@
           <a:p>
             <a:r>
               <a:rPr lang="en-US" altLang="zh-TW" dirty="0" smtClean="0"/>
-              <a:t>sprite,</a:t>
-            </a:r>
-          </a:p>
-          <a:p>
-            <a:r>
-              <a:rPr lang="en-US" altLang="zh-TW" dirty="0" smtClean="0"/>
-              <a:t>Dynamic attributes with </a:t>
+              <a:t>Use </a:t>
             </a:r>
             <a:r>
               <a:rPr lang="en-US" altLang="zh-TW" dirty="0" err="1" smtClean="0"/>
-              <a:t>shader</a:t>
-            </a:r>
-            <a:endParaRPr lang="en-US" altLang="zh-TW" dirty="0" smtClean="0"/>
-          </a:p>
-          <a:p>
-            <a:r>
-              <a:rPr lang="en-US" altLang="zh-TW" dirty="0" smtClean="0"/>
-              <a:t>Particle engine (smoke, fire, …)</a:t>
-            </a:r>
-          </a:p>
-          <a:p>
-            <a:pPr lvl="1"/>
-            <a:r>
-              <a:rPr lang="en-US" altLang="zh-TW" dirty="0" smtClean="0"/>
-              <a:t>Using </a:t>
+              <a:t>THREE.ShaderLib</a:t>
+            </a:r>
+            <a:r>
+              <a:rPr lang="en-US" altLang="zh-TW" dirty="0" smtClean="0"/>
+              <a:t> [ “</a:t>
             </a:r>
             <a:r>
               <a:rPr lang="en-US" altLang="zh-TW" dirty="0" err="1" smtClean="0"/>
-              <a:t>THREE.PointCloud</a:t>
-            </a:r>
-            <a:endParaRPr lang="en-US" altLang="zh-TW" dirty="0" smtClean="0"/>
-          </a:p>
-        </p:txBody>
-      </p:sp>
+              <a:t>normalmap</a:t>
+            </a:r>
+            <a:r>
+              <a:rPr lang="en-US" altLang="zh-TW" dirty="0" smtClean="0"/>
+              <a:t>” ]</a:t>
+            </a:r>
+          </a:p>
+          <a:p>
+            <a:r>
+              <a:rPr lang="en-US" altLang="zh-TW" dirty="0" smtClean="0"/>
+              <a:t>Own geometry?!</a:t>
+            </a:r>
+          </a:p>
+          <a:p>
+            <a:endParaRPr lang="zh-TW" altLang="en-US" dirty="0"/>
+          </a:p>
+        </p:txBody>
+      </p:sp>
+      <p:pic>
+        <p:nvPicPr>
+          <p:cNvPr id="4" name="圖片 3"/>
+          <p:cNvPicPr>
+            <a:picLocks noChangeAspect="1"/>
+          </p:cNvPicPr>
+          <p:nvPr/>
+        </p:nvPicPr>
+        <p:blipFill>
+          <a:blip r:embed="rId2"/>
+          <a:stretch>
+            <a:fillRect/>
+          </a:stretch>
+        </p:blipFill>
+        <p:spPr>
+          <a:xfrm>
+            <a:off x="1000664" y="2718146"/>
+            <a:ext cx="6939771" cy="4010457"/>
+          </a:xfrm>
+          <a:prstGeom prst="rect">
+            <a:avLst/>
+          </a:prstGeom>
+        </p:spPr>
+      </p:pic>
     </p:spTree>
     <p:extLst>
       <p:ext uri="{BB962C8B-B14F-4D97-AF65-F5344CB8AC3E}">
-        <p14:creationId xmlns:p14="http://schemas.microsoft.com/office/powerpoint/2010/main" val="426848126"/>
+        <p14:creationId xmlns:p14="http://schemas.microsoft.com/office/powerpoint/2010/main" val="28336118"/>
       </p:ext>
     </p:extLst>
   </p:cSld>
   <p:clrMapOvr>
     <a:masterClrMapping/>
   </p:clrMapOvr>
-  <p:timing>
-    <p:tnLst>
-      <p:par>
-        <p:cTn id="1" dur="indefinite" restart="never" nodeType="tmRoot"/>
-      </p:par>
-    </p:tnLst>
-  </p:timing>
 </p:sld>
 </file>
 
-<file path=ppt/slides/slide36.xml><?xml version="1.0" encoding="utf-8"?>
+<file path=ppt/slides/slide37.xml><?xml version="1.0" encoding="utf-8"?>
+<p:sld xmlns:a="http://schemas.openxmlformats.org/drawingml/2006/main" xmlns:r="http://schemas.openxmlformats.org/officeDocument/2006/relationships" xmlns:p="http://schemas.openxmlformats.org/presentationml/2006/main">
+  <p:cSld>
+    <p:spTree>
+      <p:nvGrpSpPr>
+        <p:cNvPr id="1" name=""/>
+        <p:cNvGrpSpPr/>
+        <p:nvPr/>
+      </p:nvGrpSpPr>
+      <p:grpSpPr>
+        <a:xfrm>
+          <a:off x="0" y="0"/>
+          <a:ext cx="0" cy="0"/>
+          <a:chOff x="0" y="0"/>
+          <a:chExt cx="0" cy="0"/>
+        </a:xfrm>
+      </p:grpSpPr>
+      <p:sp>
+        <p:nvSpPr>
+          <p:cNvPr id="2" name="標題 1"/>
+          <p:cNvSpPr>
+            <a:spLocks noGrp="1"/>
+          </p:cNvSpPr>
+          <p:nvPr>
+            <p:ph type="title"/>
+          </p:nvPr>
+        </p:nvSpPr>
+        <p:spPr/>
+        <p:txBody>
+          <a:bodyPr/>
+          <a:lstStyle/>
+          <a:p>
+            <a:r>
+              <a:rPr lang="en-US" altLang="zh-TW" dirty="0" err="1" smtClean="0"/>
+              <a:t>Tuts</a:t>
+            </a:r>
+            <a:r>
+              <a:rPr lang="en-US" altLang="zh-TW" dirty="0" smtClean="0"/>
+              <a:t> 29 </a:t>
+            </a:r>
+            <a:br>
+              <a:rPr lang="en-US" altLang="zh-TW" dirty="0" smtClean="0"/>
+            </a:br>
+            <a:r>
+              <a:rPr lang="en-US" altLang="zh-TW" dirty="0" smtClean="0"/>
+              <a:t>Bump map</a:t>
+            </a:r>
+            <a:endParaRPr lang="zh-TW" altLang="en-US" dirty="0"/>
+          </a:p>
+        </p:txBody>
+      </p:sp>
+      <p:sp>
+        <p:nvSpPr>
+          <p:cNvPr id="3" name="內容版面配置區 2"/>
+          <p:cNvSpPr>
+            <a:spLocks noGrp="1"/>
+          </p:cNvSpPr>
+          <p:nvPr>
+            <p:ph idx="1"/>
+          </p:nvPr>
+        </p:nvSpPr>
+        <p:spPr/>
+        <p:txBody>
+          <a:bodyPr/>
+          <a:lstStyle/>
+          <a:p>
+            <a:r>
+              <a:rPr lang="en-US" altLang="zh-TW" dirty="0" smtClean="0"/>
+              <a:t>No </a:t>
+            </a:r>
+            <a:r>
+              <a:rPr lang="en-US" altLang="zh-TW" dirty="0" err="1" smtClean="0"/>
+              <a:t>shader</a:t>
+            </a:r>
+            <a:endParaRPr lang="en-US" altLang="zh-TW" dirty="0" smtClean="0"/>
+          </a:p>
+          <a:p>
+            <a:r>
+              <a:rPr lang="en-US" altLang="zh-TW" dirty="0" smtClean="0"/>
+              <a:t>Wonder how the </a:t>
+            </a:r>
+            <a:r>
+              <a:rPr lang="en-US" altLang="zh-TW" dirty="0" err="1" smtClean="0"/>
+              <a:t>bumpmap</a:t>
+            </a:r>
+            <a:r>
+              <a:rPr lang="en-US" altLang="zh-TW" dirty="0" smtClean="0"/>
+              <a:t> is done …</a:t>
+            </a:r>
+            <a:endParaRPr lang="zh-TW" altLang="en-US" dirty="0"/>
+          </a:p>
+        </p:txBody>
+      </p:sp>
+      <p:pic>
+        <p:nvPicPr>
+          <p:cNvPr id="4" name="圖片 3"/>
+          <p:cNvPicPr>
+            <a:picLocks noChangeAspect="1"/>
+          </p:cNvPicPr>
+          <p:nvPr/>
+        </p:nvPicPr>
+        <p:blipFill>
+          <a:blip r:embed="rId2"/>
+          <a:stretch>
+            <a:fillRect/>
+          </a:stretch>
+        </p:blipFill>
+        <p:spPr>
+          <a:xfrm>
+            <a:off x="762000" y="2949574"/>
+            <a:ext cx="7620000" cy="3362325"/>
+          </a:xfrm>
+          <a:prstGeom prst="rect">
+            <a:avLst/>
+          </a:prstGeom>
+        </p:spPr>
+      </p:pic>
+    </p:spTree>
+    <p:extLst>
+      <p:ext uri="{BB962C8B-B14F-4D97-AF65-F5344CB8AC3E}">
+        <p14:creationId xmlns:p14="http://schemas.microsoft.com/office/powerpoint/2010/main" val="688983337"/>
+      </p:ext>
+    </p:extLst>
+  </p:cSld>
+  <p:clrMapOvr>
+    <a:masterClrMapping/>
+  </p:clrMapOvr>
+</p:sld>
+</file>
+
+<file path=ppt/slides/slide38.xml><?xml version="1.0" encoding="utf-8"?>
+<p:sld xmlns:a="http://schemas.openxmlformats.org/drawingml/2006/main" xmlns:r="http://schemas.openxmlformats.org/officeDocument/2006/relationships" xmlns:p="http://schemas.openxmlformats.org/presentationml/2006/main">
+  <p:cSld>
+    <p:spTree>
+      <p:nvGrpSpPr>
+        <p:cNvPr id="1" name=""/>
+        <p:cNvGrpSpPr/>
+        <p:nvPr/>
+      </p:nvGrpSpPr>
+      <p:grpSpPr>
+        <a:xfrm>
+          <a:off x="0" y="0"/>
+          <a:ext cx="0" cy="0"/>
+          <a:chOff x="0" y="0"/>
+          <a:chExt cx="0" cy="0"/>
+        </a:xfrm>
+      </p:grpSpPr>
+      <p:sp>
+        <p:nvSpPr>
+          <p:cNvPr id="2" name="標題 1"/>
+          <p:cNvSpPr>
+            <a:spLocks noGrp="1"/>
+          </p:cNvSpPr>
+          <p:nvPr>
+            <p:ph type="title"/>
+          </p:nvPr>
+        </p:nvSpPr>
+        <p:spPr/>
+        <p:txBody>
+          <a:bodyPr/>
+          <a:lstStyle/>
+          <a:p>
+            <a:endParaRPr lang="zh-TW" altLang="en-US" dirty="0"/>
+          </a:p>
+        </p:txBody>
+      </p:sp>
+      <p:sp>
+        <p:nvSpPr>
+          <p:cNvPr id="3" name="內容版面配置區 2"/>
+          <p:cNvSpPr>
+            <a:spLocks noGrp="1"/>
+          </p:cNvSpPr>
+          <p:nvPr>
+            <p:ph idx="1"/>
+          </p:nvPr>
+        </p:nvSpPr>
+        <p:spPr/>
+        <p:txBody>
+          <a:bodyPr/>
+          <a:lstStyle/>
+          <a:p>
+            <a:r>
+              <a:rPr lang="en-US" altLang="zh-TW" dirty="0" err="1" smtClean="0">
+                <a:hlinkClick r:id="rId2"/>
+              </a:rPr>
+              <a:t>url</a:t>
+            </a:r>
+            <a:endParaRPr lang="zh-TW" altLang="en-US" dirty="0"/>
+          </a:p>
+        </p:txBody>
+      </p:sp>
+      <p:pic>
+        <p:nvPicPr>
+          <p:cNvPr id="4" name="圖片 3"/>
+          <p:cNvPicPr>
+            <a:picLocks noChangeAspect="1"/>
+          </p:cNvPicPr>
+          <p:nvPr/>
+        </p:nvPicPr>
+        <p:blipFill>
+          <a:blip r:embed="rId3"/>
+          <a:stretch>
+            <a:fillRect/>
+          </a:stretch>
+        </p:blipFill>
+        <p:spPr>
+          <a:xfrm>
+            <a:off x="770716" y="2558360"/>
+            <a:ext cx="5362575" cy="2638425"/>
+          </a:xfrm>
+          <a:prstGeom prst="rect">
+            <a:avLst/>
+          </a:prstGeom>
+        </p:spPr>
+      </p:pic>
+      <p:pic>
+        <p:nvPicPr>
+          <p:cNvPr id="6" name="圖片 5"/>
+          <p:cNvPicPr>
+            <a:picLocks noChangeAspect="1"/>
+          </p:cNvPicPr>
+          <p:nvPr/>
+        </p:nvPicPr>
+        <p:blipFill>
+          <a:blip r:embed="rId4"/>
+          <a:stretch>
+            <a:fillRect/>
+          </a:stretch>
+        </p:blipFill>
+        <p:spPr>
+          <a:xfrm>
+            <a:off x="770716" y="472282"/>
+            <a:ext cx="7343775" cy="857250"/>
+          </a:xfrm>
+          <a:prstGeom prst="rect">
+            <a:avLst/>
+          </a:prstGeom>
+        </p:spPr>
+      </p:pic>
+    </p:spTree>
+    <p:extLst>
+      <p:ext uri="{BB962C8B-B14F-4D97-AF65-F5344CB8AC3E}">
+        <p14:creationId xmlns:p14="http://schemas.microsoft.com/office/powerpoint/2010/main" val="2596908366"/>
+      </p:ext>
+    </p:extLst>
+  </p:cSld>
+  <p:clrMapOvr>
+    <a:masterClrMapping/>
+  </p:clrMapOvr>
+</p:sld>
+</file>
+
+<file path=ppt/slides/slide39.xml><?xml version="1.0" encoding="utf-8"?>
 <p:sld xmlns:a="http://schemas.openxmlformats.org/drawingml/2006/main" xmlns:r="http://schemas.openxmlformats.org/officeDocument/2006/relationships" xmlns:p="http://schemas.openxmlformats.org/presentationml/2006/main">
   <p:cSld>
     <p:spTree>
@@ -6741,7 +7139,155 @@
 </p:sld>
 </file>
 
-<file path=ppt/slides/slide37.xml><?xml version="1.0" encoding="utf-8"?>
+<file path=ppt/slides/slide4.xml><?xml version="1.0" encoding="utf-8"?>
+<p:sld xmlns:a="http://schemas.openxmlformats.org/drawingml/2006/main" xmlns:r="http://schemas.openxmlformats.org/officeDocument/2006/relationships" xmlns:p="http://schemas.openxmlformats.org/presentationml/2006/main">
+  <p:cSld>
+    <p:spTree>
+      <p:nvGrpSpPr>
+        <p:cNvPr id="1" name=""/>
+        <p:cNvGrpSpPr/>
+        <p:nvPr/>
+      </p:nvGrpSpPr>
+      <p:grpSpPr>
+        <a:xfrm>
+          <a:off x="0" y="0"/>
+          <a:ext cx="0" cy="0"/>
+          <a:chOff x="0" y="0"/>
+          <a:chExt cx="0" cy="0"/>
+        </a:xfrm>
+      </p:grpSpPr>
+      <p:sp>
+        <p:nvSpPr>
+          <p:cNvPr id="2" name="標題 1"/>
+          <p:cNvSpPr>
+            <a:spLocks noGrp="1"/>
+          </p:cNvSpPr>
+          <p:nvPr>
+            <p:ph type="title"/>
+          </p:nvPr>
+        </p:nvSpPr>
+        <p:spPr/>
+        <p:txBody>
+          <a:bodyPr/>
+          <a:lstStyle/>
+          <a:p>
+            <a:r>
+              <a:rPr lang="en-US" altLang="zh-TW" dirty="0" smtClean="0"/>
+              <a:t>Ongoing</a:t>
+            </a:r>
+            <a:endParaRPr lang="zh-TW" altLang="en-US" dirty="0"/>
+          </a:p>
+        </p:txBody>
+      </p:sp>
+      <p:sp>
+        <p:nvSpPr>
+          <p:cNvPr id="3" name="內容版面配置區 2"/>
+          <p:cNvSpPr>
+            <a:spLocks noGrp="1"/>
+          </p:cNvSpPr>
+          <p:nvPr>
+            <p:ph idx="1"/>
+          </p:nvPr>
+        </p:nvSpPr>
+        <p:spPr/>
+        <p:txBody>
+          <a:bodyPr/>
+          <a:lstStyle/>
+          <a:p>
+            <a:r>
+              <a:rPr lang="en-US" altLang="zh-TW" dirty="0" smtClean="0"/>
+              <a:t>Seat booking system</a:t>
+            </a:r>
+          </a:p>
+          <a:p>
+            <a:r>
+              <a:rPr lang="en-US" altLang="zh-TW" dirty="0" smtClean="0"/>
+              <a:t>HTML Template for </a:t>
+            </a:r>
+            <a:r>
+              <a:rPr lang="en-US" altLang="zh-TW" dirty="0" err="1" smtClean="0"/>
+              <a:t>threejs</a:t>
+            </a:r>
+            <a:r>
+              <a:rPr lang="en-US" altLang="zh-TW" dirty="0" smtClean="0"/>
+              <a:t> + notes</a:t>
+            </a:r>
+          </a:p>
+          <a:p>
+            <a:r>
+              <a:rPr lang="en-US" altLang="zh-TW" dirty="0" smtClean="0"/>
+              <a:t>What’s in </a:t>
+            </a:r>
+            <a:r>
+              <a:rPr lang="en-US" altLang="zh-TW" dirty="0" err="1" smtClean="0"/>
+              <a:t>threejs</a:t>
+            </a:r>
+            <a:r>
+              <a:rPr lang="en-US" altLang="zh-TW" dirty="0" smtClean="0"/>
+              <a:t> but NOT in OpenGL </a:t>
+            </a:r>
+          </a:p>
+          <a:p>
+            <a:pPr lvl="1"/>
+            <a:r>
+              <a:rPr lang="en-US" altLang="zh-TW" dirty="0" smtClean="0"/>
+              <a:t>CSS, HTML5, …</a:t>
+            </a:r>
+          </a:p>
+          <a:p>
+            <a:r>
+              <a:rPr lang="en-US" altLang="zh-TW" dirty="0" err="1" smtClean="0"/>
+              <a:t>Jquery</a:t>
+            </a:r>
+            <a:r>
+              <a:rPr lang="en-US" altLang="zh-TW" dirty="0" smtClean="0"/>
+              <a:t>, </a:t>
+            </a:r>
+            <a:r>
+              <a:rPr lang="en-US" altLang="zh-TW" dirty="0" err="1" smtClean="0"/>
+              <a:t>jquey-ui</a:t>
+            </a:r>
+            <a:endParaRPr lang="en-US" altLang="zh-TW" dirty="0" smtClean="0"/>
+          </a:p>
+          <a:p>
+            <a:r>
+              <a:rPr lang="en-US" altLang="zh-TW" dirty="0" smtClean="0"/>
+              <a:t>Role of &lt;div&gt; in html</a:t>
+            </a:r>
+            <a:endParaRPr lang="en-US" altLang="zh-TW" dirty="0"/>
+          </a:p>
+          <a:p>
+            <a:pPr marL="0" indent="0">
+              <a:buNone/>
+            </a:pPr>
+            <a:endParaRPr lang="en-US" altLang="zh-TW" dirty="0" smtClean="0"/>
+          </a:p>
+          <a:p>
+            <a:endParaRPr lang="zh-TW" altLang="en-US" dirty="0"/>
+          </a:p>
+        </p:txBody>
+      </p:sp>
+    </p:spTree>
+    <p:extLst>
+      <p:ext uri="{BB962C8B-B14F-4D97-AF65-F5344CB8AC3E}">
+        <p14:creationId xmlns:p14="http://schemas.microsoft.com/office/powerpoint/2010/main" val="1233713405"/>
+      </p:ext>
+    </p:extLst>
+  </p:cSld>
+  <p:clrMapOvr>
+    <a:masterClrMapping/>
+  </p:clrMapOvr>
+  <p:timing>
+    <p:tnLst>
+      <p:par>
+        <p:cTn id="1" dur="indefinite" restart="never" nodeType="tmRoot"/>
+      </p:par>
+    </p:tnLst>
+  </p:timing>
+</p:sld>
+</file>
+
+<file path=ppt/slides/slide40.xml><?xml version="1.0" encoding="utf-8"?>
 <p:sld xmlns:a="http://schemas.openxmlformats.org/drawingml/2006/main" xmlns:r="http://schemas.openxmlformats.org/officeDocument/2006/relationships" xmlns:p="http://schemas.openxmlformats.org/presentationml/2006/main">
   <p:cSld>
     <p:spTree>
@@ -6906,7 +7452,7 @@
 </p:sld>
 </file>
 
-<file path=ppt/slides/slide38.xml><?xml version="1.0" encoding="utf-8"?>
+<file path=ppt/slides/slide41.xml><?xml version="1.0" encoding="utf-8"?>
 <p:sld xmlns:a="http://schemas.openxmlformats.org/drawingml/2006/main" xmlns:r="http://schemas.openxmlformats.org/officeDocument/2006/relationships" xmlns:p="http://schemas.openxmlformats.org/presentationml/2006/main">
   <p:cSld>
     <p:spTree>
@@ -6983,154 +7529,6 @@
   <p:clrMapOvr>
     <a:masterClrMapping/>
   </p:clrMapOvr>
-</p:sld>
-</file>
-
-<file path=ppt/slides/slide4.xml><?xml version="1.0" encoding="utf-8"?>
-<p:sld xmlns:a="http://schemas.openxmlformats.org/drawingml/2006/main" xmlns:r="http://schemas.openxmlformats.org/officeDocument/2006/relationships" xmlns:p="http://schemas.openxmlformats.org/presentationml/2006/main">
-  <p:cSld>
-    <p:spTree>
-      <p:nvGrpSpPr>
-        <p:cNvPr id="1" name=""/>
-        <p:cNvGrpSpPr/>
-        <p:nvPr/>
-      </p:nvGrpSpPr>
-      <p:grpSpPr>
-        <a:xfrm>
-          <a:off x="0" y="0"/>
-          <a:ext cx="0" cy="0"/>
-          <a:chOff x="0" y="0"/>
-          <a:chExt cx="0" cy="0"/>
-        </a:xfrm>
-      </p:grpSpPr>
-      <p:sp>
-        <p:nvSpPr>
-          <p:cNvPr id="2" name="標題 1"/>
-          <p:cNvSpPr>
-            <a:spLocks noGrp="1"/>
-          </p:cNvSpPr>
-          <p:nvPr>
-            <p:ph type="title"/>
-          </p:nvPr>
-        </p:nvSpPr>
-        <p:spPr/>
-        <p:txBody>
-          <a:bodyPr/>
-          <a:lstStyle/>
-          <a:p>
-            <a:r>
-              <a:rPr lang="en-US" altLang="zh-TW" dirty="0" smtClean="0"/>
-              <a:t>Ongoing</a:t>
-            </a:r>
-            <a:endParaRPr lang="zh-TW" altLang="en-US" dirty="0"/>
-          </a:p>
-        </p:txBody>
-      </p:sp>
-      <p:sp>
-        <p:nvSpPr>
-          <p:cNvPr id="3" name="內容版面配置區 2"/>
-          <p:cNvSpPr>
-            <a:spLocks noGrp="1"/>
-          </p:cNvSpPr>
-          <p:nvPr>
-            <p:ph idx="1"/>
-          </p:nvPr>
-        </p:nvSpPr>
-        <p:spPr/>
-        <p:txBody>
-          <a:bodyPr/>
-          <a:lstStyle/>
-          <a:p>
-            <a:r>
-              <a:rPr lang="en-US" altLang="zh-TW" dirty="0" smtClean="0"/>
-              <a:t>Seat booking system</a:t>
-            </a:r>
-          </a:p>
-          <a:p>
-            <a:r>
-              <a:rPr lang="en-US" altLang="zh-TW" dirty="0" smtClean="0"/>
-              <a:t>HTML Template for </a:t>
-            </a:r>
-            <a:r>
-              <a:rPr lang="en-US" altLang="zh-TW" dirty="0" err="1" smtClean="0"/>
-              <a:t>threejs</a:t>
-            </a:r>
-            <a:r>
-              <a:rPr lang="en-US" altLang="zh-TW" dirty="0" smtClean="0"/>
-              <a:t> + notes</a:t>
-            </a:r>
-          </a:p>
-          <a:p>
-            <a:r>
-              <a:rPr lang="en-US" altLang="zh-TW" dirty="0" smtClean="0"/>
-              <a:t>What’s in </a:t>
-            </a:r>
-            <a:r>
-              <a:rPr lang="en-US" altLang="zh-TW" dirty="0" err="1" smtClean="0"/>
-              <a:t>threejs</a:t>
-            </a:r>
-            <a:r>
-              <a:rPr lang="en-US" altLang="zh-TW" dirty="0" smtClean="0"/>
-              <a:t> but NOT in OpenGL </a:t>
-            </a:r>
-          </a:p>
-          <a:p>
-            <a:pPr lvl="1"/>
-            <a:r>
-              <a:rPr lang="en-US" altLang="zh-TW" dirty="0" smtClean="0"/>
-              <a:t>CSS, HTML5, …</a:t>
-            </a:r>
-          </a:p>
-          <a:p>
-            <a:r>
-              <a:rPr lang="en-US" altLang="zh-TW" dirty="0" err="1" smtClean="0"/>
-              <a:t>Jquery</a:t>
-            </a:r>
-            <a:r>
-              <a:rPr lang="en-US" altLang="zh-TW" dirty="0" smtClean="0"/>
-              <a:t>, </a:t>
-            </a:r>
-            <a:r>
-              <a:rPr lang="en-US" altLang="zh-TW" dirty="0" err="1" smtClean="0"/>
-              <a:t>jquey-ui</a:t>
-            </a:r>
-            <a:endParaRPr lang="en-US" altLang="zh-TW" dirty="0" smtClean="0"/>
-          </a:p>
-          <a:p>
-            <a:r>
-              <a:rPr lang="en-US" altLang="zh-TW" dirty="0" smtClean="0"/>
-              <a:t>Role of &lt;div&gt; in html</a:t>
-            </a:r>
-            <a:endParaRPr lang="en-US" altLang="zh-TW" dirty="0"/>
-          </a:p>
-          <a:p>
-            <a:pPr marL="0" indent="0">
-              <a:buNone/>
-            </a:pPr>
-            <a:endParaRPr lang="en-US" altLang="zh-TW" dirty="0" smtClean="0"/>
-          </a:p>
-          <a:p>
-            <a:endParaRPr lang="zh-TW" altLang="en-US" dirty="0"/>
-          </a:p>
-        </p:txBody>
-      </p:sp>
-    </p:spTree>
-    <p:extLst>
-      <p:ext uri="{BB962C8B-B14F-4D97-AF65-F5344CB8AC3E}">
-        <p14:creationId xmlns:p14="http://schemas.microsoft.com/office/powerpoint/2010/main" val="1233713405"/>
-      </p:ext>
-    </p:extLst>
-  </p:cSld>
-  <p:clrMapOvr>
-    <a:masterClrMapping/>
-  </p:clrMapOvr>
-  <p:timing>
-    <p:tnLst>
-      <p:par>
-        <p:cTn id="1" dur="indefinite" restart="never" nodeType="tmRoot"/>
-      </p:par>
-    </p:tnLst>
-  </p:timing>
 </p:sld>
 </file>
 

</xml_diff>

<commit_message>
shader & post processing
</commit_message>
<xml_diff>
--- a/threejs-tuts-3.pptx
+++ b/threejs-tuts-3.pptx
@@ -34,25 +34,27 @@
     <p:sldId id="371" r:id="rId28"/>
     <p:sldId id="372" r:id="rId29"/>
     <p:sldId id="373" r:id="rId30"/>
-    <p:sldId id="394" r:id="rId31"/>
-    <p:sldId id="395" r:id="rId32"/>
-    <p:sldId id="396" r:id="rId33"/>
-    <p:sldId id="399" r:id="rId34"/>
-    <p:sldId id="400" r:id="rId35"/>
-    <p:sldId id="401" r:id="rId36"/>
-    <p:sldId id="406" r:id="rId37"/>
-    <p:sldId id="410" r:id="rId38"/>
-    <p:sldId id="411" r:id="rId39"/>
-    <p:sldId id="402" r:id="rId40"/>
-    <p:sldId id="403" r:id="rId41"/>
-    <p:sldId id="404" r:id="rId42"/>
-    <p:sldId id="407" r:id="rId43"/>
-    <p:sldId id="408" r:id="rId44"/>
-    <p:sldId id="409" r:id="rId45"/>
-    <p:sldId id="385" r:id="rId46"/>
-    <p:sldId id="379" r:id="rId47"/>
-    <p:sldId id="405" r:id="rId48"/>
-    <p:sldId id="398" r:id="rId49"/>
+    <p:sldId id="413" r:id="rId31"/>
+    <p:sldId id="412" r:id="rId32"/>
+    <p:sldId id="394" r:id="rId33"/>
+    <p:sldId id="395" r:id="rId34"/>
+    <p:sldId id="396" r:id="rId35"/>
+    <p:sldId id="399" r:id="rId36"/>
+    <p:sldId id="400" r:id="rId37"/>
+    <p:sldId id="401" r:id="rId38"/>
+    <p:sldId id="406" r:id="rId39"/>
+    <p:sldId id="410" r:id="rId40"/>
+    <p:sldId id="411" r:id="rId41"/>
+    <p:sldId id="402" r:id="rId42"/>
+    <p:sldId id="403" r:id="rId43"/>
+    <p:sldId id="404" r:id="rId44"/>
+    <p:sldId id="407" r:id="rId45"/>
+    <p:sldId id="408" r:id="rId46"/>
+    <p:sldId id="409" r:id="rId47"/>
+    <p:sldId id="385" r:id="rId48"/>
+    <p:sldId id="379" r:id="rId49"/>
+    <p:sldId id="405" r:id="rId50"/>
+    <p:sldId id="398" r:id="rId51"/>
   </p:sldIdLst>
   <p:sldSz cx="9144000" cy="6858000" type="screen4x3"/>
   <p:notesSz cx="6797675" cy="9928225"/>
@@ -301,7 +303,7 @@
           <a:p>
             <a:fld id="{9AB96A49-BA8E-464B-A1B0-31643BCE068C}" type="datetimeFigureOut">
               <a:rPr lang="zh-TW" altLang="en-US" smtClean="0"/>
-              <a:t>2015/1/4</a:t>
+              <a:t>2015/1/10</a:t>
             </a:fld>
             <a:endParaRPr lang="zh-TW" altLang="en-US"/>
           </a:p>
@@ -471,7 +473,7 @@
           <a:p>
             <a:fld id="{9AB96A49-BA8E-464B-A1B0-31643BCE068C}" type="datetimeFigureOut">
               <a:rPr lang="zh-TW" altLang="en-US" smtClean="0"/>
-              <a:t>2015/1/4</a:t>
+              <a:t>2015/1/10</a:t>
             </a:fld>
             <a:endParaRPr lang="zh-TW" altLang="en-US"/>
           </a:p>
@@ -651,7 +653,7 @@
           <a:p>
             <a:fld id="{9AB96A49-BA8E-464B-A1B0-31643BCE068C}" type="datetimeFigureOut">
               <a:rPr lang="zh-TW" altLang="en-US" smtClean="0"/>
-              <a:t>2015/1/4</a:t>
+              <a:t>2015/1/10</a:t>
             </a:fld>
             <a:endParaRPr lang="zh-TW" altLang="en-US"/>
           </a:p>
@@ -821,7 +823,7 @@
           <a:p>
             <a:fld id="{9AB96A49-BA8E-464B-A1B0-31643BCE068C}" type="datetimeFigureOut">
               <a:rPr lang="zh-TW" altLang="en-US" smtClean="0"/>
-              <a:t>2015/1/4</a:t>
+              <a:t>2015/1/10</a:t>
             </a:fld>
             <a:endParaRPr lang="zh-TW" altLang="en-US"/>
           </a:p>
@@ -1065,7 +1067,7 @@
           <a:p>
             <a:fld id="{9AB96A49-BA8E-464B-A1B0-31643BCE068C}" type="datetimeFigureOut">
               <a:rPr lang="zh-TW" altLang="en-US" smtClean="0"/>
-              <a:t>2015/1/4</a:t>
+              <a:t>2015/1/10</a:t>
             </a:fld>
             <a:endParaRPr lang="zh-TW" altLang="en-US"/>
           </a:p>
@@ -1297,7 +1299,7 @@
           <a:p>
             <a:fld id="{9AB96A49-BA8E-464B-A1B0-31643BCE068C}" type="datetimeFigureOut">
               <a:rPr lang="zh-TW" altLang="en-US" smtClean="0"/>
-              <a:t>2015/1/4</a:t>
+              <a:t>2015/1/10</a:t>
             </a:fld>
             <a:endParaRPr lang="zh-TW" altLang="en-US"/>
           </a:p>
@@ -1664,7 +1666,7 @@
           <a:p>
             <a:fld id="{9AB96A49-BA8E-464B-A1B0-31643BCE068C}" type="datetimeFigureOut">
               <a:rPr lang="zh-TW" altLang="en-US" smtClean="0"/>
-              <a:t>2015/1/4</a:t>
+              <a:t>2015/1/10</a:t>
             </a:fld>
             <a:endParaRPr lang="zh-TW" altLang="en-US"/>
           </a:p>
@@ -1782,7 +1784,7 @@
           <a:p>
             <a:fld id="{9AB96A49-BA8E-464B-A1B0-31643BCE068C}" type="datetimeFigureOut">
               <a:rPr lang="zh-TW" altLang="en-US" smtClean="0"/>
-              <a:t>2015/1/4</a:t>
+              <a:t>2015/1/10</a:t>
             </a:fld>
             <a:endParaRPr lang="zh-TW" altLang="en-US"/>
           </a:p>
@@ -1877,7 +1879,7 @@
           <a:p>
             <a:fld id="{9AB96A49-BA8E-464B-A1B0-31643BCE068C}" type="datetimeFigureOut">
               <a:rPr lang="zh-TW" altLang="en-US" smtClean="0"/>
-              <a:t>2015/1/4</a:t>
+              <a:t>2015/1/10</a:t>
             </a:fld>
             <a:endParaRPr lang="zh-TW" altLang="en-US"/>
           </a:p>
@@ -2154,7 +2156,7 @@
           <a:p>
             <a:fld id="{9AB96A49-BA8E-464B-A1B0-31643BCE068C}" type="datetimeFigureOut">
               <a:rPr lang="zh-TW" altLang="en-US" smtClean="0"/>
-              <a:t>2015/1/4</a:t>
+              <a:t>2015/1/10</a:t>
             </a:fld>
             <a:endParaRPr lang="zh-TW" altLang="en-US"/>
           </a:p>
@@ -2411,7 +2413,7 @@
           <a:p>
             <a:fld id="{9AB96A49-BA8E-464B-A1B0-31643BCE068C}" type="datetimeFigureOut">
               <a:rPr lang="zh-TW" altLang="en-US" smtClean="0"/>
-              <a:t>2015/1/4</a:t>
+              <a:t>2015/1/10</a:t>
             </a:fld>
             <a:endParaRPr lang="zh-TW" altLang="en-US"/>
           </a:p>
@@ -2624,7 +2626,7 @@
           <a:p>
             <a:fld id="{9AB96A49-BA8E-464B-A1B0-31643BCE068C}" type="datetimeFigureOut">
               <a:rPr lang="zh-TW" altLang="en-US" smtClean="0"/>
-              <a:t>2015/1/4</a:t>
+              <a:t>2015/1/10</a:t>
             </a:fld>
             <a:endParaRPr lang="zh-TW" altLang="en-US"/>
           </a:p>
@@ -4373,7 +4375,13 @@
           </a:p>
           <a:p>
             <a:r>
-              <a:rPr lang="en-US" altLang="zh-TW" dirty="0" smtClean="0"/>
+              <a:rPr lang="en-US" altLang="zh-TW" dirty="0" smtClean="0">
+                <a:solidFill>
+                  <a:schemeClr val="bg1">
+                    <a:lumMod val="85000"/>
+                  </a:schemeClr>
+                </a:solidFill>
+              </a:rPr>
               <a:t>Fog (in progress)</a:t>
             </a:r>
           </a:p>
@@ -4445,18 +4453,32 @@
           </a:p>
           <a:p>
             <a:r>
-              <a:rPr lang="en-US" altLang="zh-TW" dirty="0" smtClean="0"/>
-              <a:t>Environment </a:t>
-            </a:r>
-            <a:r>
-              <a:rPr lang="en-US" altLang="zh-TW" dirty="0" smtClean="0"/>
-              <a:t>map, </a:t>
-            </a:r>
-            <a:r>
-              <a:rPr lang="en-US" altLang="zh-TW" dirty="0" err="1" smtClean="0"/>
+              <a:rPr lang="en-US" altLang="zh-TW" dirty="0" smtClean="0">
+                <a:solidFill>
+                  <a:schemeClr val="bg1">
+                    <a:lumMod val="85000"/>
+                  </a:schemeClr>
+                </a:solidFill>
+              </a:rPr>
+              <a:t>Environment map, </a:t>
+            </a:r>
+            <a:r>
+              <a:rPr lang="en-US" altLang="zh-TW" dirty="0" err="1" smtClean="0">
+                <a:solidFill>
+                  <a:schemeClr val="bg1">
+                    <a:lumMod val="85000"/>
+                  </a:schemeClr>
+                </a:solidFill>
+              </a:rPr>
               <a:t>cubemap</a:t>
             </a:r>
-            <a:endParaRPr lang="en-US" altLang="zh-TW" dirty="0" smtClean="0"/>
+            <a:endParaRPr lang="en-US" altLang="zh-TW" dirty="0" smtClean="0">
+              <a:solidFill>
+                <a:schemeClr val="bg1">
+                  <a:lumMod val="85000"/>
+                </a:schemeClr>
+              </a:solidFill>
+            </a:endParaRPr>
           </a:p>
           <a:p>
             <a:r>
@@ -5445,6 +5467,52 @@
           </a:p>
         </p:txBody>
       </p:sp>
+      <p:sp>
+        <p:nvSpPr>
+          <p:cNvPr id="5" name="圓角矩形 4"/>
+          <p:cNvSpPr/>
+          <p:nvPr/>
+        </p:nvSpPr>
+        <p:spPr>
+          <a:xfrm>
+            <a:off x="431321" y="1112808"/>
+            <a:ext cx="6530196" cy="836762"/>
+          </a:xfrm>
+          <a:prstGeom prst="roundRect">
+            <a:avLst/>
+          </a:prstGeom>
+          <a:noFill/>
+          <a:ln w="28575">
+            <a:solidFill>
+              <a:srgbClr val="FF0000"/>
+            </a:solidFill>
+          </a:ln>
+        </p:spPr>
+        <p:style>
+          <a:lnRef idx="2">
+            <a:schemeClr val="accent1">
+              <a:shade val="50000"/>
+            </a:schemeClr>
+          </a:lnRef>
+          <a:fillRef idx="1">
+            <a:schemeClr val="accent1"/>
+          </a:fillRef>
+          <a:effectRef idx="0">
+            <a:schemeClr val="accent1"/>
+          </a:effectRef>
+          <a:fontRef idx="minor">
+            <a:schemeClr val="lt1"/>
+          </a:fontRef>
+        </p:style>
+        <p:txBody>
+          <a:bodyPr rtlCol="0" anchor="ctr"/>
+          <a:lstStyle/>
+          <a:p>
+            <a:pPr algn="ctr"/>
+            <a:endParaRPr lang="zh-TW" altLang="en-US"/>
+          </a:p>
+        </p:txBody>
+      </p:sp>
     </p:spTree>
     <p:extLst>
       <p:ext uri="{BB962C8B-B14F-4D97-AF65-F5344CB8AC3E}">
@@ -5696,8 +5764,8 @@
         </p:nvSpPr>
         <p:spPr>
           <a:xfrm>
-            <a:off x="447675" y="2078585"/>
-            <a:ext cx="2133600" cy="512215"/>
+            <a:off x="447675" y="2320506"/>
+            <a:ext cx="2133600" cy="270294"/>
           </a:xfrm>
           <a:prstGeom prst="roundRect">
             <a:avLst/>
@@ -5980,13 +6048,25 @@
           <a:lstStyle/>
           <a:p>
             <a:r>
-              <a:rPr lang="en-US" altLang="zh-TW" dirty="0" smtClean="0"/>
+              <a:rPr lang="en-US" altLang="zh-TW" dirty="0" smtClean="0">
+                <a:solidFill>
+                  <a:schemeClr val="bg1">
+                    <a:lumMod val="85000"/>
+                  </a:schemeClr>
+                </a:solidFill>
+              </a:rPr>
               <a:t>Animated models: md2</a:t>
             </a:r>
           </a:p>
           <a:p>
             <a:r>
-              <a:rPr lang="en-US" altLang="zh-TW" dirty="0" smtClean="0"/>
+              <a:rPr lang="en-US" altLang="zh-TW" dirty="0" smtClean="0">
+                <a:solidFill>
+                  <a:schemeClr val="bg1">
+                    <a:lumMod val="85000"/>
+                  </a:schemeClr>
+                </a:solidFill>
+              </a:rPr>
               <a:t>Steer; agent “class”</a:t>
             </a:r>
           </a:p>
@@ -6113,6 +6193,252 @@
           <a:bodyPr/>
           <a:lstStyle/>
           <a:p>
+            <a:endParaRPr lang="zh-TW" altLang="en-US"/>
+          </a:p>
+        </p:txBody>
+      </p:sp>
+      <p:pic>
+        <p:nvPicPr>
+          <p:cNvPr id="3" name="圖片 2"/>
+          <p:cNvPicPr>
+            <a:picLocks noChangeAspect="1"/>
+          </p:cNvPicPr>
+          <p:nvPr/>
+        </p:nvPicPr>
+        <p:blipFill>
+          <a:blip r:embed="rId2"/>
+          <a:stretch>
+            <a:fillRect/>
+          </a:stretch>
+        </p:blipFill>
+        <p:spPr>
+          <a:xfrm>
+            <a:off x="706287" y="2407443"/>
+            <a:ext cx="3200400" cy="1228725"/>
+          </a:xfrm>
+          <a:prstGeom prst="rect">
+            <a:avLst/>
+          </a:prstGeom>
+        </p:spPr>
+      </p:pic>
+      <p:pic>
+        <p:nvPicPr>
+          <p:cNvPr id="4" name="圖片 3"/>
+          <p:cNvPicPr>
+            <a:picLocks noChangeAspect="1"/>
+          </p:cNvPicPr>
+          <p:nvPr/>
+        </p:nvPicPr>
+        <p:blipFill>
+          <a:blip r:embed="rId3"/>
+          <a:stretch>
+            <a:fillRect/>
+          </a:stretch>
+        </p:blipFill>
+        <p:spPr>
+          <a:xfrm>
+            <a:off x="706287" y="1835944"/>
+            <a:ext cx="5334000" cy="333375"/>
+          </a:xfrm>
+          <a:prstGeom prst="rect">
+            <a:avLst/>
+          </a:prstGeom>
+        </p:spPr>
+      </p:pic>
+      <p:pic>
+        <p:nvPicPr>
+          <p:cNvPr id="5" name="圖片 4"/>
+          <p:cNvPicPr>
+            <a:picLocks noChangeAspect="1"/>
+          </p:cNvPicPr>
+          <p:nvPr/>
+        </p:nvPicPr>
+        <p:blipFill>
+          <a:blip r:embed="rId4"/>
+          <a:stretch>
+            <a:fillRect/>
+          </a:stretch>
+        </p:blipFill>
+        <p:spPr>
+          <a:xfrm>
+            <a:off x="677712" y="4007865"/>
+            <a:ext cx="5391150" cy="1628775"/>
+          </a:xfrm>
+          <a:prstGeom prst="rect">
+            <a:avLst/>
+          </a:prstGeom>
+        </p:spPr>
+      </p:pic>
+      <p:sp>
+        <p:nvSpPr>
+          <p:cNvPr id="6" name="文字方塊 5"/>
+          <p:cNvSpPr txBox="1"/>
+          <p:nvPr/>
+        </p:nvSpPr>
+        <p:spPr>
+          <a:xfrm>
+            <a:off x="4408098" y="2446396"/>
+            <a:ext cx="4325608" cy="923330"/>
+          </a:xfrm>
+          <a:prstGeom prst="rect">
+            <a:avLst/>
+          </a:prstGeom>
+          <a:noFill/>
+        </p:spPr>
+        <p:txBody>
+          <a:bodyPr wrap="none" rtlCol="0">
+            <a:spAutoFit/>
+          </a:bodyPr>
+          <a:lstStyle/>
+          <a:p>
+            <a:r>
+              <a:rPr lang="en-US" altLang="zh-TW" dirty="0" err="1" smtClean="0"/>
+              <a:t>soundVal</a:t>
+            </a:r>
+            <a:r>
+              <a:rPr lang="en-US" altLang="zh-TW" dirty="0" smtClean="0"/>
+              <a:t>: constantly keep updating</a:t>
+            </a:r>
+          </a:p>
+          <a:p>
+            <a:r>
+              <a:rPr lang="en-US" altLang="zh-TW" dirty="0" smtClean="0"/>
+              <a:t>But clamped between 0 &amp; 1;</a:t>
+            </a:r>
+          </a:p>
+          <a:p>
+            <a:r>
+              <a:rPr lang="en-US" altLang="zh-TW" dirty="0" smtClean="0"/>
+              <a:t>Toggle() to switch the increment/decrement</a:t>
+            </a:r>
+          </a:p>
+        </p:txBody>
+      </p:sp>
+    </p:spTree>
+    <p:extLst>
+      <p:ext uri="{BB962C8B-B14F-4D97-AF65-F5344CB8AC3E}">
+        <p14:creationId xmlns:p14="http://schemas.microsoft.com/office/powerpoint/2010/main" val="1672038434"/>
+      </p:ext>
+    </p:extLst>
+  </p:cSld>
+  <p:clrMapOvr>
+    <a:masterClrMapping/>
+  </p:clrMapOvr>
+</p:sld>
+</file>
+
+<file path=ppt/slides/slide31.xml><?xml version="1.0" encoding="utf-8"?>
+<p:sld xmlns:a="http://schemas.openxmlformats.org/drawingml/2006/main" xmlns:r="http://schemas.openxmlformats.org/officeDocument/2006/relationships" xmlns:p="http://schemas.openxmlformats.org/presentationml/2006/main">
+  <p:cSld>
+    <p:spTree>
+      <p:nvGrpSpPr>
+        <p:cNvPr id="1" name=""/>
+        <p:cNvGrpSpPr/>
+        <p:nvPr/>
+      </p:nvGrpSpPr>
+      <p:grpSpPr>
+        <a:xfrm>
+          <a:off x="0" y="0"/>
+          <a:ext cx="0" cy="0"/>
+          <a:chOff x="0" y="0"/>
+          <a:chExt cx="0" cy="0"/>
+        </a:xfrm>
+      </p:grpSpPr>
+      <p:sp>
+        <p:nvSpPr>
+          <p:cNvPr id="2" name="標題 1"/>
+          <p:cNvSpPr>
+            <a:spLocks noGrp="1"/>
+          </p:cNvSpPr>
+          <p:nvPr>
+            <p:ph type="title"/>
+          </p:nvPr>
+        </p:nvSpPr>
+        <p:spPr/>
+        <p:txBody>
+          <a:bodyPr/>
+          <a:lstStyle/>
+          <a:p>
+            <a:r>
+              <a:rPr lang="en-US" altLang="zh-TW" dirty="0" err="1" smtClean="0"/>
+              <a:t>Tuts</a:t>
+            </a:r>
+            <a:r>
+              <a:rPr lang="en-US" altLang="zh-TW" dirty="0" smtClean="0"/>
+              <a:t> 23-2</a:t>
+            </a:r>
+            <a:endParaRPr lang="zh-TW" altLang="en-US" dirty="0"/>
+          </a:p>
+        </p:txBody>
+      </p:sp>
+      <p:sp>
+        <p:nvSpPr>
+          <p:cNvPr id="3" name="內容版面配置區 2"/>
+          <p:cNvSpPr>
+            <a:spLocks noGrp="1"/>
+          </p:cNvSpPr>
+          <p:nvPr>
+            <p:ph idx="1"/>
+          </p:nvPr>
+        </p:nvSpPr>
+        <p:spPr/>
+        <p:txBody>
+          <a:bodyPr/>
+          <a:lstStyle/>
+          <a:p>
+            <a:r>
+              <a:rPr lang="en-US" altLang="zh-TW" dirty="0" smtClean="0"/>
+              <a:t>Platform with walls</a:t>
+            </a:r>
+            <a:endParaRPr lang="zh-TW" altLang="en-US" dirty="0"/>
+          </a:p>
+        </p:txBody>
+      </p:sp>
+    </p:spTree>
+    <p:extLst>
+      <p:ext uri="{BB962C8B-B14F-4D97-AF65-F5344CB8AC3E}">
+        <p14:creationId xmlns:p14="http://schemas.microsoft.com/office/powerpoint/2010/main" val="2002032470"/>
+      </p:ext>
+    </p:extLst>
+  </p:cSld>
+  <p:clrMapOvr>
+    <a:masterClrMapping/>
+  </p:clrMapOvr>
+</p:sld>
+</file>
+
+<file path=ppt/slides/slide32.xml><?xml version="1.0" encoding="utf-8"?>
+<p:sld xmlns:a="http://schemas.openxmlformats.org/drawingml/2006/main" xmlns:r="http://schemas.openxmlformats.org/officeDocument/2006/relationships" xmlns:p="http://schemas.openxmlformats.org/presentationml/2006/main">
+  <p:cSld>
+    <p:spTree>
+      <p:nvGrpSpPr>
+        <p:cNvPr id="1" name=""/>
+        <p:cNvGrpSpPr/>
+        <p:nvPr/>
+      </p:nvGrpSpPr>
+      <p:grpSpPr>
+        <a:xfrm>
+          <a:off x="0" y="0"/>
+          <a:ext cx="0" cy="0"/>
+          <a:chOff x="0" y="0"/>
+          <a:chExt cx="0" cy="0"/>
+        </a:xfrm>
+      </p:grpSpPr>
+      <p:sp>
+        <p:nvSpPr>
+          <p:cNvPr id="2" name="標題 1"/>
+          <p:cNvSpPr>
+            <a:spLocks noGrp="1"/>
+          </p:cNvSpPr>
+          <p:nvPr>
+            <p:ph type="title"/>
+          </p:nvPr>
+        </p:nvSpPr>
+        <p:spPr/>
+        <p:txBody>
+          <a:bodyPr/>
+          <a:lstStyle/>
+          <a:p>
             <a:r>
               <a:rPr lang="en-US" altLang="zh-TW" dirty="0" err="1" smtClean="0"/>
               <a:t>Tuts</a:t>
@@ -6192,7 +6518,7 @@
 </p:sld>
 </file>
 
-<file path=ppt/slides/slide31.xml><?xml version="1.0" encoding="utf-8"?>
+<file path=ppt/slides/slide33.xml><?xml version="1.0" encoding="utf-8"?>
 <p:sld xmlns:a="http://schemas.openxmlformats.org/drawingml/2006/main" xmlns:r="http://schemas.openxmlformats.org/officeDocument/2006/relationships" xmlns:p="http://schemas.openxmlformats.org/presentationml/2006/main">
   <p:cSld>
     <p:spTree>
@@ -6303,7 +6629,7 @@
 </p:sld>
 </file>
 
-<file path=ppt/slides/slide32.xml><?xml version="1.0" encoding="utf-8"?>
+<file path=ppt/slides/slide34.xml><?xml version="1.0" encoding="utf-8"?>
 <p:sld xmlns:a="http://schemas.openxmlformats.org/drawingml/2006/main" xmlns:r="http://schemas.openxmlformats.org/officeDocument/2006/relationships" xmlns:p="http://schemas.openxmlformats.org/presentationml/2006/main">
   <p:cSld>
     <p:spTree>
@@ -6422,128 +6748,6 @@
 </p:sld>
 </file>
 
-<file path=ppt/slides/slide33.xml><?xml version="1.0" encoding="utf-8"?>
-<p:sld xmlns:a="http://schemas.openxmlformats.org/drawingml/2006/main" xmlns:r="http://schemas.openxmlformats.org/officeDocument/2006/relationships" xmlns:p="http://schemas.openxmlformats.org/presentationml/2006/main">
-  <p:cSld>
-    <p:spTree>
-      <p:nvGrpSpPr>
-        <p:cNvPr id="1" name=""/>
-        <p:cNvGrpSpPr/>
-        <p:nvPr/>
-      </p:nvGrpSpPr>
-      <p:grpSpPr>
-        <a:xfrm>
-          <a:off x="0" y="0"/>
-          <a:ext cx="0" cy="0"/>
-          <a:chOff x="0" y="0"/>
-          <a:chExt cx="0" cy="0"/>
-        </a:xfrm>
-      </p:grpSpPr>
-      <p:sp>
-        <p:nvSpPr>
-          <p:cNvPr id="2" name="標題 1"/>
-          <p:cNvSpPr>
-            <a:spLocks noGrp="1"/>
-          </p:cNvSpPr>
-          <p:nvPr>
-            <p:ph type="title"/>
-          </p:nvPr>
-        </p:nvSpPr>
-        <p:spPr/>
-        <p:txBody>
-          <a:bodyPr/>
-          <a:lstStyle/>
-          <a:p>
-            <a:r>
-              <a:rPr lang="en-US" altLang="zh-TW" dirty="0" err="1" smtClean="0"/>
-              <a:t>Tuts</a:t>
-            </a:r>
-            <a:r>
-              <a:rPr lang="en-US" altLang="zh-TW" dirty="0" smtClean="0"/>
-              <a:t> 25: Fog</a:t>
-            </a:r>
-            <a:endParaRPr lang="zh-TW" altLang="en-US" dirty="0"/>
-          </a:p>
-        </p:txBody>
-      </p:sp>
-    </p:spTree>
-    <p:extLst>
-      <p:ext uri="{BB962C8B-B14F-4D97-AF65-F5344CB8AC3E}">
-        <p14:creationId xmlns:p14="http://schemas.microsoft.com/office/powerpoint/2010/main" val="4138659837"/>
-      </p:ext>
-    </p:extLst>
-  </p:cSld>
-  <p:clrMapOvr>
-    <a:masterClrMapping/>
-  </p:clrMapOvr>
-</p:sld>
-</file>
-
-<file path=ppt/slides/slide34.xml><?xml version="1.0" encoding="utf-8"?>
-<p:sld xmlns:a="http://schemas.openxmlformats.org/drawingml/2006/main" xmlns:r="http://schemas.openxmlformats.org/officeDocument/2006/relationships" xmlns:p="http://schemas.openxmlformats.org/presentationml/2006/main">
-  <p:cSld>
-    <p:spTree>
-      <p:nvGrpSpPr>
-        <p:cNvPr id="1" name=""/>
-        <p:cNvGrpSpPr/>
-        <p:nvPr/>
-      </p:nvGrpSpPr>
-      <p:grpSpPr>
-        <a:xfrm>
-          <a:off x="0" y="0"/>
-          <a:ext cx="0" cy="0"/>
-          <a:chOff x="0" y="0"/>
-          <a:chExt cx="0" cy="0"/>
-        </a:xfrm>
-      </p:grpSpPr>
-      <p:sp>
-        <p:nvSpPr>
-          <p:cNvPr id="2" name="標題 1"/>
-          <p:cNvSpPr>
-            <a:spLocks noGrp="1"/>
-          </p:cNvSpPr>
-          <p:nvPr>
-            <p:ph type="title"/>
-          </p:nvPr>
-        </p:nvSpPr>
-        <p:spPr/>
-        <p:txBody>
-          <a:bodyPr/>
-          <a:lstStyle/>
-          <a:p>
-            <a:r>
-              <a:rPr lang="en-US" altLang="zh-TW" dirty="0" err="1" smtClean="0"/>
-              <a:t>Tuts</a:t>
-            </a:r>
-            <a:r>
-              <a:rPr lang="en-US" altLang="zh-TW" dirty="0" smtClean="0"/>
-              <a:t> 26: Agent (</a:t>
-            </a:r>
-            <a:r>
-              <a:rPr lang="en-US" altLang="zh-TW" dirty="0" err="1" smtClean="0"/>
-              <a:t>Seek,Arrival,Collision</a:t>
-            </a:r>
-            <a:r>
-              <a:rPr lang="en-US" altLang="zh-TW" dirty="0" smtClean="0"/>
-              <a:t>)</a:t>
-            </a:r>
-            <a:endParaRPr lang="zh-TW" altLang="en-US" dirty="0"/>
-          </a:p>
-        </p:txBody>
-      </p:sp>
-    </p:spTree>
-    <p:extLst>
-      <p:ext uri="{BB962C8B-B14F-4D97-AF65-F5344CB8AC3E}">
-        <p14:creationId xmlns:p14="http://schemas.microsoft.com/office/powerpoint/2010/main" val="1832340457"/>
-      </p:ext>
-    </p:extLst>
-  </p:cSld>
-  <p:clrMapOvr>
-    <a:masterClrMapping/>
-  </p:clrMapOvr>
-</p:sld>
-</file>
-
 <file path=ppt/slides/slide35.xml><?xml version="1.0" encoding="utf-8"?>
 <p:sld xmlns:a="http://schemas.openxmlformats.org/drawingml/2006/main" xmlns:r="http://schemas.openxmlformats.org/officeDocument/2006/relationships" xmlns:p="http://schemas.openxmlformats.org/presentationml/2006/main">
   <p:cSld>
@@ -6582,66 +6786,16 @@
             </a:r>
             <a:r>
               <a:rPr lang="en-US" altLang="zh-TW" dirty="0" smtClean="0"/>
-              <a:t> 27</a:t>
-            </a:r>
-            <a:br>
-              <a:rPr lang="en-US" altLang="zh-TW" dirty="0" smtClean="0"/>
-            </a:br>
-            <a:r>
-              <a:rPr lang="en-US" altLang="zh-TW" dirty="0" smtClean="0"/>
-              <a:t>MD2</a:t>
+              <a:t> 25: Fog</a:t>
             </a:r>
             <a:endParaRPr lang="zh-TW" altLang="en-US" dirty="0"/>
           </a:p>
         </p:txBody>
       </p:sp>
-      <p:sp>
-        <p:nvSpPr>
-          <p:cNvPr id="3" name="內容版面配置區 2"/>
-          <p:cNvSpPr>
-            <a:spLocks noGrp="1"/>
-          </p:cNvSpPr>
-          <p:nvPr>
-            <p:ph idx="1"/>
-          </p:nvPr>
-        </p:nvSpPr>
-        <p:spPr/>
-        <p:txBody>
-          <a:bodyPr/>
-          <a:lstStyle/>
-          <a:p>
-            <a:endParaRPr lang="zh-TW" altLang="en-US" dirty="0"/>
-          </a:p>
-        </p:txBody>
-      </p:sp>
-      <p:pic>
-        <p:nvPicPr>
-          <p:cNvPr id="4" name="圖片 3"/>
-          <p:cNvPicPr>
-            <a:picLocks noChangeAspect="1"/>
-          </p:cNvPicPr>
-          <p:nvPr/>
-        </p:nvPicPr>
-        <p:blipFill>
-          <a:blip r:embed="rId2"/>
-          <a:stretch>
-            <a:fillRect/>
-          </a:stretch>
-        </p:blipFill>
-        <p:spPr>
-          <a:xfrm>
-            <a:off x="2547398" y="365126"/>
-            <a:ext cx="5705475" cy="5610225"/>
-          </a:xfrm>
-          <a:prstGeom prst="rect">
-            <a:avLst/>
-          </a:prstGeom>
-        </p:spPr>
-      </p:pic>
     </p:spTree>
     <p:extLst>
       <p:ext uri="{BB962C8B-B14F-4D97-AF65-F5344CB8AC3E}">
-        <p14:creationId xmlns:p14="http://schemas.microsoft.com/office/powerpoint/2010/main" val="1779083210"/>
+        <p14:creationId xmlns:p14="http://schemas.microsoft.com/office/powerpoint/2010/main" val="4138659837"/>
       </p:ext>
     </p:extLst>
   </p:cSld>
@@ -6685,232 +6839,28 @@
           <a:p>
             <a:r>
               <a:rPr lang="en-US" altLang="zh-TW" dirty="0" err="1" smtClean="0"/>
-              <a:t>MorphAnimMesh</a:t>
+              <a:t>Tuts</a:t>
+            </a:r>
+            <a:r>
+              <a:rPr lang="en-US" altLang="zh-TW" dirty="0" smtClean="0"/>
+              <a:t> 26: Agent (</a:t>
+            </a:r>
+            <a:r>
+              <a:rPr lang="en-US" altLang="zh-TW" dirty="0" err="1" smtClean="0"/>
+              <a:t>Seek,Arrival,Collision</a:t>
+            </a:r>
+            <a:r>
+              <a:rPr lang="en-US" altLang="zh-TW" dirty="0" smtClean="0"/>
+              <a:t>)</a:t>
             </a:r>
             <a:endParaRPr lang="zh-TW" altLang="en-US" dirty="0"/>
           </a:p>
         </p:txBody>
       </p:sp>
-      <p:pic>
-        <p:nvPicPr>
-          <p:cNvPr id="4" name="圖片 3"/>
-          <p:cNvPicPr>
-            <a:picLocks noChangeAspect="1"/>
-          </p:cNvPicPr>
-          <p:nvPr/>
-        </p:nvPicPr>
-        <p:blipFill>
-          <a:blip r:embed="rId2"/>
-          <a:stretch>
-            <a:fillRect/>
-          </a:stretch>
-        </p:blipFill>
-        <p:spPr>
-          <a:xfrm>
-            <a:off x="699639" y="1690689"/>
-            <a:ext cx="2724150" cy="819150"/>
-          </a:xfrm>
-          <a:prstGeom prst="rect">
-            <a:avLst/>
-          </a:prstGeom>
-        </p:spPr>
-      </p:pic>
-      <p:pic>
-        <p:nvPicPr>
-          <p:cNvPr id="5" name="圖片 4"/>
-          <p:cNvPicPr>
-            <a:picLocks noChangeAspect="1"/>
-          </p:cNvPicPr>
-          <p:nvPr/>
-        </p:nvPicPr>
-        <p:blipFill>
-          <a:blip r:embed="rId3"/>
-          <a:stretch>
-            <a:fillRect/>
-          </a:stretch>
-        </p:blipFill>
-        <p:spPr>
-          <a:xfrm>
-            <a:off x="3104880" y="2723669"/>
-            <a:ext cx="2228850" cy="762000"/>
-          </a:xfrm>
-          <a:prstGeom prst="rect">
-            <a:avLst/>
-          </a:prstGeom>
-        </p:spPr>
-      </p:pic>
-      <p:pic>
-        <p:nvPicPr>
-          <p:cNvPr id="6" name="圖片 5"/>
-          <p:cNvPicPr>
-            <a:picLocks noChangeAspect="1"/>
-          </p:cNvPicPr>
-          <p:nvPr/>
-        </p:nvPicPr>
-        <p:blipFill>
-          <a:blip r:embed="rId4"/>
-          <a:stretch>
-            <a:fillRect/>
-          </a:stretch>
-        </p:blipFill>
-        <p:spPr>
-          <a:xfrm>
-            <a:off x="766313" y="2771775"/>
-            <a:ext cx="1676400" cy="552450"/>
-          </a:xfrm>
-          <a:prstGeom prst="rect">
-            <a:avLst/>
-          </a:prstGeom>
-        </p:spPr>
-      </p:pic>
-      <p:pic>
-        <p:nvPicPr>
-          <p:cNvPr id="7" name="圖片 6"/>
-          <p:cNvPicPr>
-            <a:picLocks noChangeAspect="1"/>
-          </p:cNvPicPr>
-          <p:nvPr/>
-        </p:nvPicPr>
-        <p:blipFill>
-          <a:blip r:embed="rId5"/>
-          <a:stretch>
-            <a:fillRect/>
-          </a:stretch>
-        </p:blipFill>
-        <p:spPr>
-          <a:xfrm>
-            <a:off x="3104880" y="3658707"/>
-            <a:ext cx="1876425" cy="533400"/>
-          </a:xfrm>
-          <a:prstGeom prst="rect">
-            <a:avLst/>
-          </a:prstGeom>
-        </p:spPr>
-      </p:pic>
-      <p:pic>
-        <p:nvPicPr>
-          <p:cNvPr id="8" name="圖片 7"/>
-          <p:cNvPicPr>
-            <a:picLocks noChangeAspect="1"/>
-          </p:cNvPicPr>
-          <p:nvPr/>
-        </p:nvPicPr>
-        <p:blipFill>
-          <a:blip r:embed="rId6"/>
-          <a:stretch>
-            <a:fillRect/>
-          </a:stretch>
-        </p:blipFill>
-        <p:spPr>
-          <a:xfrm>
-            <a:off x="3104880" y="4239732"/>
-            <a:ext cx="1933575" cy="628650"/>
-          </a:xfrm>
-          <a:prstGeom prst="rect">
-            <a:avLst/>
-          </a:prstGeom>
-        </p:spPr>
-      </p:pic>
-      <p:pic>
-        <p:nvPicPr>
-          <p:cNvPr id="9" name="圖片 8"/>
-          <p:cNvPicPr>
-            <a:picLocks noChangeAspect="1"/>
-          </p:cNvPicPr>
-          <p:nvPr/>
-        </p:nvPicPr>
-        <p:blipFill>
-          <a:blip r:embed="rId7"/>
-          <a:stretch>
-            <a:fillRect/>
-          </a:stretch>
-        </p:blipFill>
-        <p:spPr>
-          <a:xfrm>
-            <a:off x="3098051" y="4946170"/>
-            <a:ext cx="1914525" cy="523875"/>
-          </a:xfrm>
-          <a:prstGeom prst="rect">
-            <a:avLst/>
-          </a:prstGeom>
-        </p:spPr>
-      </p:pic>
-      <p:pic>
-        <p:nvPicPr>
-          <p:cNvPr id="10" name="圖片 9"/>
-          <p:cNvPicPr>
-            <a:picLocks noChangeAspect="1"/>
-          </p:cNvPicPr>
-          <p:nvPr/>
-        </p:nvPicPr>
-        <p:blipFill>
-          <a:blip r:embed="rId8"/>
-          <a:stretch>
-            <a:fillRect/>
-          </a:stretch>
-        </p:blipFill>
-        <p:spPr>
-          <a:xfrm>
-            <a:off x="964270" y="3744584"/>
-            <a:ext cx="1362075" cy="561975"/>
-          </a:xfrm>
-          <a:prstGeom prst="rect">
-            <a:avLst/>
-          </a:prstGeom>
-        </p:spPr>
-      </p:pic>
-      <p:pic>
-        <p:nvPicPr>
-          <p:cNvPr id="11" name="圖片 10"/>
-          <p:cNvPicPr>
-            <a:picLocks noChangeAspect="1"/>
-          </p:cNvPicPr>
-          <p:nvPr/>
-        </p:nvPicPr>
-        <p:blipFill>
-          <a:blip r:embed="rId9"/>
-          <a:stretch>
-            <a:fillRect/>
-          </a:stretch>
-        </p:blipFill>
-        <p:spPr>
-          <a:xfrm>
-            <a:off x="954745" y="4279420"/>
-            <a:ext cx="1371600" cy="561975"/>
-          </a:xfrm>
-          <a:prstGeom prst="rect">
-            <a:avLst/>
-          </a:prstGeom>
-        </p:spPr>
-      </p:pic>
-      <p:pic>
-        <p:nvPicPr>
-          <p:cNvPr id="12" name="圖片 11"/>
-          <p:cNvPicPr>
-            <a:picLocks noChangeAspect="1"/>
-          </p:cNvPicPr>
-          <p:nvPr/>
-        </p:nvPicPr>
-        <p:blipFill>
-          <a:blip r:embed="rId10"/>
-          <a:stretch>
-            <a:fillRect/>
-          </a:stretch>
-        </p:blipFill>
-        <p:spPr>
-          <a:xfrm>
-            <a:off x="813939" y="4841395"/>
-            <a:ext cx="1247775" cy="628650"/>
-          </a:xfrm>
-          <a:prstGeom prst="rect">
-            <a:avLst/>
-          </a:prstGeom>
-        </p:spPr>
-      </p:pic>
     </p:spTree>
     <p:extLst>
       <p:ext uri="{BB962C8B-B14F-4D97-AF65-F5344CB8AC3E}">
-        <p14:creationId xmlns:p14="http://schemas.microsoft.com/office/powerpoint/2010/main" val="873618101"/>
+        <p14:creationId xmlns:p14="http://schemas.microsoft.com/office/powerpoint/2010/main" val="1832340457"/>
       </p:ext>
     </p:extLst>
   </p:cSld>
@@ -6958,16 +6908,66 @@
             </a:r>
             <a:r>
               <a:rPr lang="en-US" altLang="zh-TW" dirty="0" smtClean="0"/>
-              <a:t> 27-1 How to use MD2</a:t>
+              <a:t> 27</a:t>
+            </a:r>
+            <a:br>
+              <a:rPr lang="en-US" altLang="zh-TW" dirty="0" smtClean="0"/>
+            </a:br>
+            <a:r>
+              <a:rPr lang="en-US" altLang="zh-TW" dirty="0" smtClean="0"/>
+              <a:t>MD2</a:t>
             </a:r>
             <a:endParaRPr lang="zh-TW" altLang="en-US" dirty="0"/>
           </a:p>
         </p:txBody>
       </p:sp>
+      <p:sp>
+        <p:nvSpPr>
+          <p:cNvPr id="3" name="內容版面配置區 2"/>
+          <p:cNvSpPr>
+            <a:spLocks noGrp="1"/>
+          </p:cNvSpPr>
+          <p:nvPr>
+            <p:ph idx="1"/>
+          </p:nvPr>
+        </p:nvSpPr>
+        <p:spPr/>
+        <p:txBody>
+          <a:bodyPr/>
+          <a:lstStyle/>
+          <a:p>
+            <a:endParaRPr lang="zh-TW" altLang="en-US" dirty="0"/>
+          </a:p>
+        </p:txBody>
+      </p:sp>
+      <p:pic>
+        <p:nvPicPr>
+          <p:cNvPr id="4" name="圖片 3"/>
+          <p:cNvPicPr>
+            <a:picLocks noChangeAspect="1"/>
+          </p:cNvPicPr>
+          <p:nvPr/>
+        </p:nvPicPr>
+        <p:blipFill>
+          <a:blip r:embed="rId2"/>
+          <a:stretch>
+            <a:fillRect/>
+          </a:stretch>
+        </p:blipFill>
+        <p:spPr>
+          <a:xfrm>
+            <a:off x="2547398" y="365126"/>
+            <a:ext cx="5705475" cy="5610225"/>
+          </a:xfrm>
+          <a:prstGeom prst="rect">
+            <a:avLst/>
+          </a:prstGeom>
+        </p:spPr>
+      </p:pic>
     </p:spTree>
     <p:extLst>
       <p:ext uri="{BB962C8B-B14F-4D97-AF65-F5344CB8AC3E}">
-        <p14:creationId xmlns:p14="http://schemas.microsoft.com/office/powerpoint/2010/main" val="4027401841"/>
+        <p14:creationId xmlns:p14="http://schemas.microsoft.com/office/powerpoint/2010/main" val="1779083210"/>
       </p:ext>
     </p:extLst>
   </p:cSld>
@@ -7011,111 +7011,232 @@
           <a:p>
             <a:r>
               <a:rPr lang="en-US" altLang="zh-TW" dirty="0" err="1" smtClean="0"/>
-              <a:t>Tuts</a:t>
-            </a:r>
-            <a:r>
-              <a:rPr lang="en-US" altLang="zh-TW" dirty="0" smtClean="0"/>
-              <a:t> 27-2 </a:t>
-            </a:r>
-            <a:r>
-              <a:rPr lang="en-US" altLang="zh-TW" dirty="0" err="1" smtClean="0"/>
-              <a:t>Collada</a:t>
+              <a:t>MorphAnimMesh</a:t>
             </a:r>
             <a:endParaRPr lang="zh-TW" altLang="en-US" dirty="0"/>
           </a:p>
         </p:txBody>
       </p:sp>
-      <p:sp>
-        <p:nvSpPr>
-          <p:cNvPr id="3" name="內容版面配置區 2"/>
-          <p:cNvSpPr>
-            <a:spLocks noGrp="1"/>
-          </p:cNvSpPr>
-          <p:nvPr>
-            <p:ph idx="1"/>
-          </p:nvPr>
-        </p:nvSpPr>
-        <p:spPr/>
-        <p:txBody>
-          <a:bodyPr/>
-          <a:lstStyle/>
-          <a:p>
-            <a:r>
-              <a:rPr lang="en-US" altLang="zh-TW" dirty="0" err="1" smtClean="0"/>
-              <a:t>THREE.AnimationHanlder.update</a:t>
-            </a:r>
-            <a:r>
-              <a:rPr lang="en-US" altLang="zh-TW" dirty="0" smtClean="0"/>
-              <a:t> (</a:t>
-            </a:r>
-            <a:r>
-              <a:rPr lang="en-US" altLang="zh-TW" dirty="0" err="1" smtClean="0"/>
-              <a:t>deltaT</a:t>
-            </a:r>
-            <a:r>
-              <a:rPr lang="en-US" altLang="zh-TW" dirty="0" smtClean="0"/>
-              <a:t>);</a:t>
-            </a:r>
-          </a:p>
-          <a:p>
-            <a:r>
-              <a:rPr lang="en-US" altLang="zh-TW" dirty="0" smtClean="0"/>
-              <a:t>Different from md2’s</a:t>
-            </a:r>
-          </a:p>
-          <a:p>
-            <a:pPr lvl="1"/>
-            <a:r>
-              <a:rPr lang="en-US" altLang="zh-TW" dirty="0" err="1" smtClean="0"/>
-              <a:t>Mesh.updateAnimation</a:t>
-            </a:r>
-            <a:endParaRPr lang="en-US" altLang="zh-TW" dirty="0" smtClean="0"/>
-          </a:p>
-          <a:p>
-            <a:r>
-              <a:rPr lang="en-US" altLang="zh-TW" dirty="0" err="1" smtClean="0"/>
-              <a:t>AnimMesh</a:t>
-            </a:r>
-            <a:r>
-              <a:rPr lang="en-US" altLang="zh-TW" dirty="0" smtClean="0"/>
-              <a:t> vs. </a:t>
-            </a:r>
-            <a:r>
-              <a:rPr lang="en-US" altLang="zh-TW" dirty="0" err="1" smtClean="0"/>
-              <a:t>SkinnedMesh</a:t>
-            </a:r>
-            <a:r>
-              <a:rPr lang="en-US" altLang="zh-TW" dirty="0" smtClean="0"/>
-              <a:t> …</a:t>
-            </a:r>
-          </a:p>
-          <a:p>
-            <a:r>
-              <a:rPr lang="en-US" altLang="zh-TW" dirty="0" smtClean="0"/>
-              <a:t>Need move in-depth study</a:t>
-            </a:r>
-          </a:p>
-          <a:p>
-            <a:r>
-              <a:rPr lang="en-US" altLang="zh-TW" dirty="0" err="1" smtClean="0"/>
-              <a:t>Mixamo</a:t>
-            </a:r>
-            <a:r>
-              <a:rPr lang="en-US" altLang="zh-TW" dirty="0" smtClean="0"/>
-              <a:t> output cannot work (some kind of </a:t>
-            </a:r>
-            <a:r>
-              <a:rPr lang="en-US" altLang="zh-TW" smtClean="0"/>
-              <a:t>syntax problem…)</a:t>
-            </a:r>
-            <a:endParaRPr lang="zh-TW" altLang="en-US"/>
-          </a:p>
-        </p:txBody>
-      </p:sp>
+      <p:pic>
+        <p:nvPicPr>
+          <p:cNvPr id="4" name="圖片 3"/>
+          <p:cNvPicPr>
+            <a:picLocks noChangeAspect="1"/>
+          </p:cNvPicPr>
+          <p:nvPr/>
+        </p:nvPicPr>
+        <p:blipFill>
+          <a:blip r:embed="rId2"/>
+          <a:stretch>
+            <a:fillRect/>
+          </a:stretch>
+        </p:blipFill>
+        <p:spPr>
+          <a:xfrm>
+            <a:off x="699639" y="1690689"/>
+            <a:ext cx="2724150" cy="819150"/>
+          </a:xfrm>
+          <a:prstGeom prst="rect">
+            <a:avLst/>
+          </a:prstGeom>
+        </p:spPr>
+      </p:pic>
+      <p:pic>
+        <p:nvPicPr>
+          <p:cNvPr id="5" name="圖片 4"/>
+          <p:cNvPicPr>
+            <a:picLocks noChangeAspect="1"/>
+          </p:cNvPicPr>
+          <p:nvPr/>
+        </p:nvPicPr>
+        <p:blipFill>
+          <a:blip r:embed="rId3"/>
+          <a:stretch>
+            <a:fillRect/>
+          </a:stretch>
+        </p:blipFill>
+        <p:spPr>
+          <a:xfrm>
+            <a:off x="3104880" y="2723669"/>
+            <a:ext cx="2228850" cy="762000"/>
+          </a:xfrm>
+          <a:prstGeom prst="rect">
+            <a:avLst/>
+          </a:prstGeom>
+        </p:spPr>
+      </p:pic>
+      <p:pic>
+        <p:nvPicPr>
+          <p:cNvPr id="6" name="圖片 5"/>
+          <p:cNvPicPr>
+            <a:picLocks noChangeAspect="1"/>
+          </p:cNvPicPr>
+          <p:nvPr/>
+        </p:nvPicPr>
+        <p:blipFill>
+          <a:blip r:embed="rId4"/>
+          <a:stretch>
+            <a:fillRect/>
+          </a:stretch>
+        </p:blipFill>
+        <p:spPr>
+          <a:xfrm>
+            <a:off x="766313" y="2771775"/>
+            <a:ext cx="1676400" cy="552450"/>
+          </a:xfrm>
+          <a:prstGeom prst="rect">
+            <a:avLst/>
+          </a:prstGeom>
+        </p:spPr>
+      </p:pic>
+      <p:pic>
+        <p:nvPicPr>
+          <p:cNvPr id="7" name="圖片 6"/>
+          <p:cNvPicPr>
+            <a:picLocks noChangeAspect="1"/>
+          </p:cNvPicPr>
+          <p:nvPr/>
+        </p:nvPicPr>
+        <p:blipFill>
+          <a:blip r:embed="rId5"/>
+          <a:stretch>
+            <a:fillRect/>
+          </a:stretch>
+        </p:blipFill>
+        <p:spPr>
+          <a:xfrm>
+            <a:off x="3104880" y="3658707"/>
+            <a:ext cx="1876425" cy="533400"/>
+          </a:xfrm>
+          <a:prstGeom prst="rect">
+            <a:avLst/>
+          </a:prstGeom>
+        </p:spPr>
+      </p:pic>
+      <p:pic>
+        <p:nvPicPr>
+          <p:cNvPr id="8" name="圖片 7"/>
+          <p:cNvPicPr>
+            <a:picLocks noChangeAspect="1"/>
+          </p:cNvPicPr>
+          <p:nvPr/>
+        </p:nvPicPr>
+        <p:blipFill>
+          <a:blip r:embed="rId6"/>
+          <a:stretch>
+            <a:fillRect/>
+          </a:stretch>
+        </p:blipFill>
+        <p:spPr>
+          <a:xfrm>
+            <a:off x="3104880" y="4239732"/>
+            <a:ext cx="1933575" cy="628650"/>
+          </a:xfrm>
+          <a:prstGeom prst="rect">
+            <a:avLst/>
+          </a:prstGeom>
+        </p:spPr>
+      </p:pic>
+      <p:pic>
+        <p:nvPicPr>
+          <p:cNvPr id="9" name="圖片 8"/>
+          <p:cNvPicPr>
+            <a:picLocks noChangeAspect="1"/>
+          </p:cNvPicPr>
+          <p:nvPr/>
+        </p:nvPicPr>
+        <p:blipFill>
+          <a:blip r:embed="rId7"/>
+          <a:stretch>
+            <a:fillRect/>
+          </a:stretch>
+        </p:blipFill>
+        <p:spPr>
+          <a:xfrm>
+            <a:off x="3098051" y="4946170"/>
+            <a:ext cx="1914525" cy="523875"/>
+          </a:xfrm>
+          <a:prstGeom prst="rect">
+            <a:avLst/>
+          </a:prstGeom>
+        </p:spPr>
+      </p:pic>
+      <p:pic>
+        <p:nvPicPr>
+          <p:cNvPr id="10" name="圖片 9"/>
+          <p:cNvPicPr>
+            <a:picLocks noChangeAspect="1"/>
+          </p:cNvPicPr>
+          <p:nvPr/>
+        </p:nvPicPr>
+        <p:blipFill>
+          <a:blip r:embed="rId8"/>
+          <a:stretch>
+            <a:fillRect/>
+          </a:stretch>
+        </p:blipFill>
+        <p:spPr>
+          <a:xfrm>
+            <a:off x="964270" y="3744584"/>
+            <a:ext cx="1362075" cy="561975"/>
+          </a:xfrm>
+          <a:prstGeom prst="rect">
+            <a:avLst/>
+          </a:prstGeom>
+        </p:spPr>
+      </p:pic>
+      <p:pic>
+        <p:nvPicPr>
+          <p:cNvPr id="11" name="圖片 10"/>
+          <p:cNvPicPr>
+            <a:picLocks noChangeAspect="1"/>
+          </p:cNvPicPr>
+          <p:nvPr/>
+        </p:nvPicPr>
+        <p:blipFill>
+          <a:blip r:embed="rId9"/>
+          <a:stretch>
+            <a:fillRect/>
+          </a:stretch>
+        </p:blipFill>
+        <p:spPr>
+          <a:xfrm>
+            <a:off x="954745" y="4279420"/>
+            <a:ext cx="1371600" cy="561975"/>
+          </a:xfrm>
+          <a:prstGeom prst="rect">
+            <a:avLst/>
+          </a:prstGeom>
+        </p:spPr>
+      </p:pic>
+      <p:pic>
+        <p:nvPicPr>
+          <p:cNvPr id="12" name="圖片 11"/>
+          <p:cNvPicPr>
+            <a:picLocks noChangeAspect="1"/>
+          </p:cNvPicPr>
+          <p:nvPr/>
+        </p:nvPicPr>
+        <p:blipFill>
+          <a:blip r:embed="rId10"/>
+          <a:stretch>
+            <a:fillRect/>
+          </a:stretch>
+        </p:blipFill>
+        <p:spPr>
+          <a:xfrm>
+            <a:off x="813939" y="4841395"/>
+            <a:ext cx="1247775" cy="628650"/>
+          </a:xfrm>
+          <a:prstGeom prst="rect">
+            <a:avLst/>
+          </a:prstGeom>
+        </p:spPr>
+      </p:pic>
     </p:spTree>
     <p:extLst>
       <p:ext uri="{BB962C8B-B14F-4D97-AF65-F5344CB8AC3E}">
-        <p14:creationId xmlns:p14="http://schemas.microsoft.com/office/powerpoint/2010/main" val="1177159533"/>
+        <p14:creationId xmlns:p14="http://schemas.microsoft.com/office/powerpoint/2010/main" val="873618101"/>
       </p:ext>
     </p:extLst>
   </p:cSld>
@@ -7163,102 +7284,16 @@
             </a:r>
             <a:r>
               <a:rPr lang="en-US" altLang="zh-TW" dirty="0" smtClean="0"/>
-              <a:t> 28 </a:t>
-            </a:r>
-            <a:br>
-              <a:rPr lang="en-US" altLang="zh-TW" dirty="0" smtClean="0"/>
-            </a:br>
-            <a:r>
-              <a:rPr lang="en-US" altLang="zh-TW" dirty="0" smtClean="0"/>
-              <a:t>Normal</a:t>
-            </a:r>
-            <a:r>
-              <a:rPr lang="zh-TW" altLang="en-US" dirty="0" smtClean="0"/>
-              <a:t> </a:t>
-            </a:r>
-            <a:r>
-              <a:rPr lang="en-US" altLang="zh-TW" dirty="0" smtClean="0"/>
-              <a:t>map</a:t>
+              <a:t> 27-1 How to use MD2</a:t>
             </a:r>
             <a:endParaRPr lang="zh-TW" altLang="en-US" dirty="0"/>
           </a:p>
         </p:txBody>
       </p:sp>
-      <p:sp>
-        <p:nvSpPr>
-          <p:cNvPr id="3" name="內容版面配置區 2"/>
-          <p:cNvSpPr>
-            <a:spLocks noGrp="1"/>
-          </p:cNvSpPr>
-          <p:nvPr>
-            <p:ph idx="1"/>
-          </p:nvPr>
-        </p:nvSpPr>
-        <p:spPr/>
-        <p:txBody>
-          <a:bodyPr/>
-          <a:lstStyle/>
-          <a:p>
-            <a:r>
-              <a:rPr lang="en-US" altLang="zh-TW" dirty="0" smtClean="0"/>
-              <a:t>Use </a:t>
-            </a:r>
-            <a:r>
-              <a:rPr lang="en-US" altLang="zh-TW" dirty="0" err="1" smtClean="0"/>
-              <a:t>THREE.ShaderLib</a:t>
-            </a:r>
-            <a:r>
-              <a:rPr lang="en-US" altLang="zh-TW" dirty="0" smtClean="0"/>
-              <a:t> [ “</a:t>
-            </a:r>
-            <a:r>
-              <a:rPr lang="en-US" altLang="zh-TW" dirty="0" err="1" smtClean="0"/>
-              <a:t>normalmap</a:t>
-            </a:r>
-            <a:r>
-              <a:rPr lang="en-US" altLang="zh-TW" dirty="0" smtClean="0"/>
-              <a:t>” ]</a:t>
-            </a:r>
-          </a:p>
-          <a:p>
-            <a:r>
-              <a:rPr lang="en-US" altLang="zh-TW" dirty="0" smtClean="0"/>
-              <a:t>Own geometry?!</a:t>
-            </a:r>
-          </a:p>
-          <a:p>
-            <a:endParaRPr lang="zh-TW" altLang="en-US" dirty="0"/>
-          </a:p>
-        </p:txBody>
-      </p:sp>
-      <p:pic>
-        <p:nvPicPr>
-          <p:cNvPr id="4" name="圖片 3"/>
-          <p:cNvPicPr>
-            <a:picLocks noChangeAspect="1"/>
-          </p:cNvPicPr>
-          <p:nvPr/>
-        </p:nvPicPr>
-        <p:blipFill>
-          <a:blip r:embed="rId2"/>
-          <a:stretch>
-            <a:fillRect/>
-          </a:stretch>
-        </p:blipFill>
-        <p:spPr>
-          <a:xfrm>
-            <a:off x="1000664" y="2718146"/>
-            <a:ext cx="6939771" cy="4010457"/>
-          </a:xfrm>
-          <a:prstGeom prst="rect">
-            <a:avLst/>
-          </a:prstGeom>
-        </p:spPr>
-      </p:pic>
     </p:spTree>
     <p:extLst>
       <p:ext uri="{BB962C8B-B14F-4D97-AF65-F5344CB8AC3E}">
-        <p14:creationId xmlns:p14="http://schemas.microsoft.com/office/powerpoint/2010/main" val="28336118"/>
+        <p14:creationId xmlns:p14="http://schemas.microsoft.com/office/powerpoint/2010/main" val="4027401841"/>
       </p:ext>
     </p:extLst>
   </p:cSld>
@@ -7454,14 +7489,11 @@
             </a:r>
             <a:r>
               <a:rPr lang="en-US" altLang="zh-TW" dirty="0" smtClean="0"/>
-              <a:t> 29 </a:t>
-            </a:r>
-            <a:br>
-              <a:rPr lang="en-US" altLang="zh-TW" dirty="0" smtClean="0"/>
-            </a:br>
-            <a:r>
-              <a:rPr lang="en-US" altLang="zh-TW" dirty="0" smtClean="0"/>
-              <a:t>Bump map</a:t>
+              <a:t> 27-2 </a:t>
+            </a:r>
+            <a:r>
+              <a:rPr lang="en-US" altLang="zh-TW" dirty="0" err="1" smtClean="0"/>
+              <a:t>Collada</a:t>
             </a:r>
             <a:endParaRPr lang="zh-TW" altLang="en-US" dirty="0"/>
           </a:p>
@@ -7483,60 +7515,81 @@
           <a:lstStyle/>
           <a:p>
             <a:r>
-              <a:rPr lang="en-US" altLang="zh-TW" dirty="0" smtClean="0"/>
-              <a:t>No </a:t>
-            </a:r>
-            <a:r>
               <a:rPr lang="en-US" altLang="zh-TW" dirty="0" err="1" smtClean="0"/>
-              <a:t>shader</a:t>
+              <a:t>THREE.AnimationHanlder.update</a:t>
+            </a:r>
+            <a:r>
+              <a:rPr lang="en-US" altLang="zh-TW" dirty="0" smtClean="0"/>
+              <a:t> (</a:t>
+            </a:r>
+            <a:r>
+              <a:rPr lang="en-US" altLang="zh-TW" dirty="0" err="1" smtClean="0"/>
+              <a:t>deltaT</a:t>
+            </a:r>
+            <a:r>
+              <a:rPr lang="en-US" altLang="zh-TW" dirty="0" smtClean="0"/>
+              <a:t>);</a:t>
+            </a:r>
+          </a:p>
+          <a:p>
+            <a:r>
+              <a:rPr lang="en-US" altLang="zh-TW" dirty="0" smtClean="0"/>
+              <a:t>Different from md2’s</a:t>
+            </a:r>
+          </a:p>
+          <a:p>
+            <a:pPr lvl="1"/>
+            <a:r>
+              <a:rPr lang="en-US" altLang="zh-TW" dirty="0" err="1" smtClean="0"/>
+              <a:t>Mesh.updateAnimation</a:t>
             </a:r>
             <a:endParaRPr lang="en-US" altLang="zh-TW" dirty="0" smtClean="0"/>
           </a:p>
           <a:p>
             <a:r>
-              <a:rPr lang="en-US" altLang="zh-TW" dirty="0" smtClean="0"/>
-              <a:t>Wonder how the </a:t>
-            </a:r>
-            <a:r>
               <a:rPr lang="en-US" altLang="zh-TW" dirty="0" err="1" smtClean="0"/>
-              <a:t>bumpmap</a:t>
-            </a:r>
-            <a:r>
-              <a:rPr lang="en-US" altLang="zh-TW" dirty="0" smtClean="0"/>
-              <a:t> is done …</a:t>
-            </a:r>
-            <a:endParaRPr lang="zh-TW" altLang="en-US" dirty="0"/>
-          </a:p>
-        </p:txBody>
-      </p:sp>
-      <p:pic>
-        <p:nvPicPr>
-          <p:cNvPr id="4" name="圖片 3"/>
-          <p:cNvPicPr>
-            <a:picLocks noChangeAspect="1"/>
-          </p:cNvPicPr>
-          <p:nvPr/>
-        </p:nvPicPr>
-        <p:blipFill>
-          <a:blip r:embed="rId2"/>
-          <a:stretch>
-            <a:fillRect/>
-          </a:stretch>
-        </p:blipFill>
-        <p:spPr>
-          <a:xfrm>
-            <a:off x="762000" y="2949574"/>
-            <a:ext cx="7620000" cy="3362325"/>
-          </a:xfrm>
-          <a:prstGeom prst="rect">
-            <a:avLst/>
-          </a:prstGeom>
-        </p:spPr>
-      </p:pic>
+              <a:t>AnimMesh</a:t>
+            </a:r>
+            <a:r>
+              <a:rPr lang="en-US" altLang="zh-TW" dirty="0" smtClean="0"/>
+              <a:t> vs. </a:t>
+            </a:r>
+            <a:r>
+              <a:rPr lang="en-US" altLang="zh-TW" dirty="0" err="1" smtClean="0"/>
+              <a:t>SkinnedMesh</a:t>
+            </a:r>
+            <a:r>
+              <a:rPr lang="en-US" altLang="zh-TW" dirty="0" smtClean="0"/>
+              <a:t> …</a:t>
+            </a:r>
+          </a:p>
+          <a:p>
+            <a:r>
+              <a:rPr lang="en-US" altLang="zh-TW" dirty="0" smtClean="0"/>
+              <a:t>Need move in-depth study</a:t>
+            </a:r>
+          </a:p>
+          <a:p>
+            <a:r>
+              <a:rPr lang="en-US" altLang="zh-TW" dirty="0" err="1" smtClean="0"/>
+              <a:t>Mixamo</a:t>
+            </a:r>
+            <a:r>
+              <a:rPr lang="en-US" altLang="zh-TW" dirty="0" smtClean="0"/>
+              <a:t> output cannot work (some kind of </a:t>
+            </a:r>
+            <a:r>
+              <a:rPr lang="en-US" altLang="zh-TW" smtClean="0"/>
+              <a:t>syntax problem…)</a:t>
+            </a:r>
+            <a:endParaRPr lang="zh-TW" altLang="en-US"/>
+          </a:p>
+        </p:txBody>
+      </p:sp>
     </p:spTree>
     <p:extLst>
       <p:ext uri="{BB962C8B-B14F-4D97-AF65-F5344CB8AC3E}">
-        <p14:creationId xmlns:p14="http://schemas.microsoft.com/office/powerpoint/2010/main" val="688983337"/>
+        <p14:creationId xmlns:p14="http://schemas.microsoft.com/office/powerpoint/2010/main" val="1177159533"/>
       </p:ext>
     </p:extLst>
   </p:cSld>
@@ -7578,6 +7631,29 @@
           <a:bodyPr/>
           <a:lstStyle/>
           <a:p>
+            <a:r>
+              <a:rPr lang="en-US" altLang="zh-TW" dirty="0" err="1" smtClean="0"/>
+              <a:t>Tuts</a:t>
+            </a:r>
+            <a:r>
+              <a:rPr lang="en-US" altLang="zh-TW" dirty="0" smtClean="0"/>
+              <a:t> 28 </a:t>
+            </a:r>
+            <a:br>
+              <a:rPr lang="en-US" altLang="zh-TW" dirty="0" smtClean="0"/>
+            </a:br>
+            <a:r>
+              <a:rPr lang="en-US" altLang="zh-TW" dirty="0" smtClean="0"/>
+              <a:t>Normal</a:t>
+            </a:r>
+            <a:r>
+              <a:rPr lang="zh-TW" altLang="en-US" dirty="0" smtClean="0"/>
+              <a:t> </a:t>
+            </a:r>
+            <a:r>
+              <a:rPr lang="en-US" altLang="zh-TW" dirty="0" smtClean="0"/>
+              <a:t>map</a:t>
+            </a:r>
             <a:endParaRPr lang="zh-TW" altLang="en-US" dirty="0"/>
           </a:p>
         </p:txBody>
@@ -7598,11 +7674,33 @@
           <a:lstStyle/>
           <a:p>
             <a:r>
-              <a:rPr lang="en-US" altLang="zh-TW" dirty="0" err="1" smtClean="0">
-                <a:hlinkClick r:id="rId2"/>
-              </a:rPr>
-              <a:t>url</a:t>
-            </a:r>
+              <a:rPr lang="en-US" altLang="zh-TW" dirty="0" smtClean="0"/>
+              <a:t>Use </a:t>
+            </a:r>
+            <a:r>
+              <a:rPr lang="en-US" altLang="zh-TW" dirty="0" err="1" smtClean="0"/>
+              <a:t>THREE.ShaderLib</a:t>
+            </a:r>
+            <a:r>
+              <a:rPr lang="en-US" altLang="zh-TW" dirty="0" smtClean="0"/>
+              <a:t> [ “</a:t>
+            </a:r>
+            <a:r>
+              <a:rPr lang="en-US" altLang="zh-TW" dirty="0" err="1" smtClean="0"/>
+              <a:t>normalmap</a:t>
+            </a:r>
+            <a:r>
+              <a:rPr lang="en-US" altLang="zh-TW" dirty="0" smtClean="0"/>
+              <a:t>” ]</a:t>
+            </a:r>
+          </a:p>
+          <a:p>
+            <a:r>
+              <a:rPr lang="en-US" altLang="zh-TW" dirty="0" smtClean="0"/>
+              <a:t>Own geometry?!</a:t>
+            </a:r>
+          </a:p>
+          <a:p>
             <a:endParaRPr lang="zh-TW" altLang="en-US" dirty="0"/>
           </a:p>
         </p:txBody>
@@ -7616,39 +7714,15 @@
           <p:nvPr/>
         </p:nvPicPr>
         <p:blipFill>
-          <a:blip r:embed="rId3"/>
+          <a:blip r:embed="rId2"/>
           <a:stretch>
             <a:fillRect/>
           </a:stretch>
         </p:blipFill>
         <p:spPr>
           <a:xfrm>
-            <a:off x="770716" y="2558360"/>
-            <a:ext cx="5362575" cy="2638425"/>
-          </a:xfrm>
-          <a:prstGeom prst="rect">
-            <a:avLst/>
-          </a:prstGeom>
-        </p:spPr>
-      </p:pic>
-      <p:pic>
-        <p:nvPicPr>
-          <p:cNvPr id="6" name="圖片 5"/>
-          <p:cNvPicPr>
-            <a:picLocks noChangeAspect="1"/>
-          </p:cNvPicPr>
-          <p:nvPr/>
-        </p:nvPicPr>
-        <p:blipFill>
-          <a:blip r:embed="rId4"/>
-          <a:stretch>
-            <a:fillRect/>
-          </a:stretch>
-        </p:blipFill>
-        <p:spPr>
-          <a:xfrm>
-            <a:off x="770716" y="472282"/>
-            <a:ext cx="7343775" cy="857250"/>
+            <a:off x="1000664" y="2718146"/>
+            <a:ext cx="6939771" cy="4010457"/>
           </a:xfrm>
           <a:prstGeom prst="rect">
             <a:avLst/>
@@ -7658,7 +7732,7 @@
     </p:spTree>
     <p:extLst>
       <p:ext uri="{BB962C8B-B14F-4D97-AF65-F5344CB8AC3E}">
-        <p14:creationId xmlns:p14="http://schemas.microsoft.com/office/powerpoint/2010/main" val="2596908366"/>
+        <p14:creationId xmlns:p14="http://schemas.microsoft.com/office/powerpoint/2010/main" val="28336118"/>
       </p:ext>
     </p:extLst>
   </p:cSld>
@@ -7706,32 +7780,58 @@
             </a:r>
             <a:r>
               <a:rPr lang="en-US" altLang="zh-TW" dirty="0" smtClean="0"/>
-              <a:t> 30 </a:t>
+              <a:t> 29 </a:t>
+            </a:r>
+            <a:br>
+              <a:rPr lang="en-US" altLang="zh-TW" dirty="0" smtClean="0"/>
+            </a:br>
+            <a:r>
+              <a:rPr lang="en-US" altLang="zh-TW" dirty="0" smtClean="0"/>
+              <a:t>Bump map</a:t>
+            </a:r>
+            <a:endParaRPr lang="zh-TW" altLang="en-US" dirty="0"/>
+          </a:p>
+        </p:txBody>
+      </p:sp>
+      <p:sp>
+        <p:nvSpPr>
+          <p:cNvPr id="3" name="內容版面配置區 2"/>
+          <p:cNvSpPr>
+            <a:spLocks noGrp="1"/>
+          </p:cNvSpPr>
+          <p:nvPr>
+            <p:ph idx="1"/>
+          </p:nvPr>
+        </p:nvSpPr>
+        <p:spPr/>
+        <p:txBody>
+          <a:bodyPr/>
+          <a:lstStyle/>
+          <a:p>
+            <a:r>
+              <a:rPr lang="en-US" altLang="zh-TW" dirty="0" smtClean="0"/>
+              <a:t>No </a:t>
             </a:r>
             <a:r>
               <a:rPr lang="en-US" altLang="zh-TW" dirty="0" err="1" smtClean="0"/>
-              <a:t>Cubemap</a:t>
+              <a:t>shader</a:t>
+            </a:r>
+            <a:endParaRPr lang="en-US" altLang="zh-TW" dirty="0" smtClean="0"/>
+          </a:p>
+          <a:p>
+            <a:r>
+              <a:rPr lang="en-US" altLang="zh-TW" dirty="0" smtClean="0"/>
+              <a:t>Wonder how the </a:t>
+            </a:r>
+            <a:r>
+              <a:rPr lang="en-US" altLang="zh-TW" dirty="0" err="1" smtClean="0"/>
+              <a:t>bumpmap</a:t>
+            </a:r>
+            <a:r>
+              <a:rPr lang="en-US" altLang="zh-TW" dirty="0" smtClean="0"/>
+              <a:t> is done …</a:t>
             </a:r>
             <a:endParaRPr lang="zh-TW" altLang="en-US" dirty="0"/>
-          </a:p>
-        </p:txBody>
-      </p:sp>
-      <p:sp>
-        <p:nvSpPr>
-          <p:cNvPr id="3" name="內容版面配置區 2"/>
-          <p:cNvSpPr>
-            <a:spLocks noGrp="1"/>
-          </p:cNvSpPr>
-          <p:nvPr>
-            <p:ph idx="1"/>
-          </p:nvPr>
-        </p:nvSpPr>
-        <p:spPr/>
-        <p:txBody>
-          <a:bodyPr/>
-          <a:lstStyle/>
-          <a:p>
-            <a:endParaRPr lang="zh-TW" altLang="en-US"/>
           </a:p>
         </p:txBody>
       </p:sp>
@@ -7751,8 +7851,8 @@
         </p:blipFill>
         <p:spPr>
           <a:xfrm>
-            <a:off x="1662112" y="1800225"/>
-            <a:ext cx="5819775" cy="5057775"/>
+            <a:off x="762000" y="2949574"/>
+            <a:ext cx="7620000" cy="3362325"/>
           </a:xfrm>
           <a:prstGeom prst="rect">
             <a:avLst/>
@@ -7762,7 +7862,7 @@
     </p:spTree>
     <p:extLst>
       <p:ext uri="{BB962C8B-B14F-4D97-AF65-F5344CB8AC3E}">
-        <p14:creationId xmlns:p14="http://schemas.microsoft.com/office/powerpoint/2010/main" val="1424534269"/>
+        <p14:creationId xmlns:p14="http://schemas.microsoft.com/office/powerpoint/2010/main" val="688983337"/>
       </p:ext>
     </p:extLst>
   </p:cSld>
@@ -7804,7 +7904,7 @@
           <a:bodyPr/>
           <a:lstStyle/>
           <a:p>
-            <a:endParaRPr lang="zh-TW" altLang="en-US"/>
+            <a:endParaRPr lang="zh-TW" altLang="en-US" dirty="0"/>
           </a:p>
         </p:txBody>
       </p:sp>
@@ -7823,6 +7923,12 @@
           <a:bodyPr/>
           <a:lstStyle/>
           <a:p>
+            <a:r>
+              <a:rPr lang="en-US" altLang="zh-TW" dirty="0" err="1" smtClean="0">
+                <a:hlinkClick r:id="rId2"/>
+              </a:rPr>
+              <a:t>url</a:t>
+            </a:r>
             <a:endParaRPr lang="zh-TW" altLang="en-US" dirty="0"/>
           </a:p>
         </p:txBody>
@@ -7830,30 +7936,6 @@
       <p:pic>
         <p:nvPicPr>
           <p:cNvPr id="4" name="圖片 3"/>
-          <p:cNvPicPr>
-            <a:picLocks noChangeAspect="1"/>
-          </p:cNvPicPr>
-          <p:nvPr/>
-        </p:nvPicPr>
-        <p:blipFill>
-          <a:blip r:embed="rId2"/>
-          <a:stretch>
-            <a:fillRect/>
-          </a:stretch>
-        </p:blipFill>
-        <p:spPr>
-          <a:xfrm>
-            <a:off x="228600" y="152401"/>
-            <a:ext cx="5033513" cy="2584777"/>
-          </a:xfrm>
-          <a:prstGeom prst="rect">
-            <a:avLst/>
-          </a:prstGeom>
-        </p:spPr>
-      </p:pic>
-      <p:pic>
-        <p:nvPicPr>
-          <p:cNvPr id="5" name="圖片 4"/>
           <p:cNvPicPr>
             <a:picLocks noChangeAspect="1"/>
           </p:cNvPicPr>
@@ -7867,8 +7949,32 @@
         </p:blipFill>
         <p:spPr>
           <a:xfrm>
-            <a:off x="239743" y="2949903"/>
-            <a:ext cx="5086350" cy="2943225"/>
+            <a:off x="770716" y="2558360"/>
+            <a:ext cx="5362575" cy="2638425"/>
+          </a:xfrm>
+          <a:prstGeom prst="rect">
+            <a:avLst/>
+          </a:prstGeom>
+        </p:spPr>
+      </p:pic>
+      <p:pic>
+        <p:nvPicPr>
+          <p:cNvPr id="6" name="圖片 5"/>
+          <p:cNvPicPr>
+            <a:picLocks noChangeAspect="1"/>
+          </p:cNvPicPr>
+          <p:nvPr/>
+        </p:nvPicPr>
+        <p:blipFill>
+          <a:blip r:embed="rId4"/>
+          <a:stretch>
+            <a:fillRect/>
+          </a:stretch>
+        </p:blipFill>
+        <p:spPr>
+          <a:xfrm>
+            <a:off x="770716" y="472282"/>
+            <a:ext cx="7343775" cy="857250"/>
           </a:xfrm>
           <a:prstGeom prst="rect">
             <a:avLst/>
@@ -7878,7 +7984,7 @@
     </p:spTree>
     <p:extLst>
       <p:ext uri="{BB962C8B-B14F-4D97-AF65-F5344CB8AC3E}">
-        <p14:creationId xmlns:p14="http://schemas.microsoft.com/office/powerpoint/2010/main" val="4146549290"/>
+        <p14:creationId xmlns:p14="http://schemas.microsoft.com/office/powerpoint/2010/main" val="2596908366"/>
       </p:ext>
     </p:extLst>
   </p:cSld>
@@ -7907,12 +8013,43 @@
       </p:grpSpPr>
       <p:sp>
         <p:nvSpPr>
-          <p:cNvPr id="6" name="標題 5"/>
+          <p:cNvPr id="2" name="標題 1"/>
           <p:cNvSpPr>
             <a:spLocks noGrp="1"/>
           </p:cNvSpPr>
           <p:nvPr>
             <p:ph type="title"/>
+          </p:nvPr>
+        </p:nvSpPr>
+        <p:spPr/>
+        <p:txBody>
+          <a:bodyPr/>
+          <a:lstStyle/>
+          <a:p>
+            <a:r>
+              <a:rPr lang="en-US" altLang="zh-TW" dirty="0" err="1" smtClean="0"/>
+              <a:t>Tuts</a:t>
+            </a:r>
+            <a:r>
+              <a:rPr lang="en-US" altLang="zh-TW" dirty="0" smtClean="0"/>
+              <a:t> 30 </a:t>
+            </a:r>
+            <a:r>
+              <a:rPr lang="en-US" altLang="zh-TW" dirty="0" err="1" smtClean="0"/>
+              <a:t>Cubemap</a:t>
+            </a:r>
+            <a:endParaRPr lang="zh-TW" altLang="en-US" dirty="0"/>
+          </a:p>
+        </p:txBody>
+      </p:sp>
+      <p:sp>
+        <p:nvSpPr>
+          <p:cNvPr id="3" name="內容版面配置區 2"/>
+          <p:cNvSpPr>
+            <a:spLocks noGrp="1"/>
+          </p:cNvSpPr>
+          <p:nvPr>
+            <p:ph idx="1"/>
           </p:nvPr>
         </p:nvSpPr>
         <p:spPr/>
@@ -7940,88 +8077,18 @@
         </p:blipFill>
         <p:spPr>
           <a:xfrm>
-            <a:off x="323850" y="1946096"/>
-            <a:ext cx="8820150" cy="523875"/>
+            <a:off x="1662112" y="1800225"/>
+            <a:ext cx="5819775" cy="5057775"/>
           </a:xfrm>
           <a:prstGeom prst="rect">
             <a:avLst/>
           </a:prstGeom>
         </p:spPr>
       </p:pic>
-      <p:pic>
-        <p:nvPicPr>
-          <p:cNvPr id="5" name="圖片 4"/>
-          <p:cNvPicPr>
-            <a:picLocks noChangeAspect="1"/>
-          </p:cNvPicPr>
-          <p:nvPr/>
-        </p:nvPicPr>
-        <p:blipFill>
-          <a:blip r:embed="rId3"/>
-          <a:stretch>
-            <a:fillRect/>
-          </a:stretch>
-        </p:blipFill>
-        <p:spPr>
-          <a:xfrm>
-            <a:off x="323850" y="2916747"/>
-            <a:ext cx="6096000" cy="2238375"/>
-          </a:xfrm>
-          <a:prstGeom prst="rect">
-            <a:avLst/>
-          </a:prstGeom>
-        </p:spPr>
-      </p:pic>
-      <p:sp>
-        <p:nvSpPr>
-          <p:cNvPr id="7" name="圓角矩形 6"/>
-          <p:cNvSpPr/>
-          <p:nvPr/>
-        </p:nvSpPr>
-        <p:spPr>
-          <a:xfrm>
-            <a:off x="628650" y="3433313"/>
-            <a:ext cx="898225" cy="276045"/>
-          </a:xfrm>
-          <a:prstGeom prst="roundRect">
-            <a:avLst/>
-          </a:prstGeom>
-          <a:noFill/>
-          <a:ln w="38100">
-            <a:solidFill>
-              <a:srgbClr val="FF0000"/>
-            </a:solidFill>
-          </a:ln>
-        </p:spPr>
-        <p:style>
-          <a:lnRef idx="2">
-            <a:schemeClr val="accent1">
-              <a:shade val="50000"/>
-            </a:schemeClr>
-          </a:lnRef>
-          <a:fillRef idx="1">
-            <a:schemeClr val="accent1"/>
-          </a:fillRef>
-          <a:effectRef idx="0">
-            <a:schemeClr val="accent1"/>
-          </a:effectRef>
-          <a:fontRef idx="minor">
-            <a:schemeClr val="lt1"/>
-          </a:fontRef>
-        </p:style>
-        <p:txBody>
-          <a:bodyPr rtlCol="0" anchor="ctr"/>
-          <a:lstStyle/>
-          <a:p>
-            <a:pPr algn="ctr"/>
-            <a:endParaRPr lang="zh-TW" altLang="en-US"/>
-          </a:p>
-        </p:txBody>
-      </p:sp>
     </p:spTree>
     <p:extLst>
       <p:ext uri="{BB962C8B-B14F-4D97-AF65-F5344CB8AC3E}">
-        <p14:creationId xmlns:p14="http://schemas.microsoft.com/office/powerpoint/2010/main" val="1710384037"/>
+        <p14:creationId xmlns:p14="http://schemas.microsoft.com/office/powerpoint/2010/main" val="1424534269"/>
       </p:ext>
     </p:extLst>
   </p:cSld>
@@ -8063,80 +8130,87 @@
           <a:bodyPr/>
           <a:lstStyle/>
           <a:p>
-            <a:r>
-              <a:rPr lang="en-US" altLang="zh-TW" dirty="0" smtClean="0"/>
-              <a:t>Booking system</a:t>
-            </a:r>
+            <a:endParaRPr lang="zh-TW" altLang="en-US"/>
+          </a:p>
+        </p:txBody>
+      </p:sp>
+      <p:sp>
+        <p:nvSpPr>
+          <p:cNvPr id="3" name="內容版面配置區 2"/>
+          <p:cNvSpPr>
+            <a:spLocks noGrp="1"/>
+          </p:cNvSpPr>
+          <p:nvPr>
+            <p:ph idx="1"/>
+          </p:nvPr>
+        </p:nvSpPr>
+        <p:spPr/>
+        <p:txBody>
+          <a:bodyPr/>
+          <a:lstStyle/>
+          <a:p>
             <a:endParaRPr lang="zh-TW" altLang="en-US" dirty="0"/>
           </a:p>
         </p:txBody>
       </p:sp>
-      <p:sp>
-        <p:nvSpPr>
-          <p:cNvPr id="3" name="內容版面配置區 2"/>
-          <p:cNvSpPr>
-            <a:spLocks noGrp="1"/>
-          </p:cNvSpPr>
-          <p:nvPr>
-            <p:ph idx="1"/>
-          </p:nvPr>
-        </p:nvSpPr>
-        <p:spPr/>
-        <p:txBody>
-          <a:bodyPr/>
-          <a:lstStyle/>
-          <a:p>
-            <a:r>
-              <a:rPr lang="en-US" altLang="zh-TW" dirty="0" smtClean="0">
-                <a:hlinkClick r:id="rId2"/>
-              </a:rPr>
-              <a:t>http://jsfiddle.net/caa1211/1fd8dyhs/20/</a:t>
-            </a:r>
-            <a:endParaRPr lang="en-US" altLang="zh-TW" dirty="0" smtClean="0"/>
-          </a:p>
-          <a:p>
-            <a:r>
-              <a:rPr lang="en-US" altLang="zh-TW" dirty="0" smtClean="0">
-                <a:hlinkClick r:id="rId3"/>
-              </a:rPr>
-              <a:t>http</a:t>
-            </a:r>
-            <a:r>
-              <a:rPr lang="en-US" altLang="zh-TW" dirty="0">
-                <a:hlinkClick r:id="rId3"/>
-              </a:rPr>
-              <a:t>://</a:t>
-            </a:r>
-            <a:r>
-              <a:rPr lang="en-US" altLang="zh-TW" dirty="0" smtClean="0">
-                <a:hlinkClick r:id="rId3"/>
-              </a:rPr>
-              <a:t>stackoverflow.com/questions/3107543/what-is-the-symbol-used-for-in-javascript</a:t>
-            </a:r>
-            <a:endParaRPr lang="en-US" altLang="zh-TW" dirty="0" smtClean="0"/>
-          </a:p>
-          <a:p>
-            <a:endParaRPr lang="zh-TW" altLang="en-US" dirty="0"/>
-          </a:p>
-        </p:txBody>
-      </p:sp>
+      <p:pic>
+        <p:nvPicPr>
+          <p:cNvPr id="4" name="圖片 3"/>
+          <p:cNvPicPr>
+            <a:picLocks noChangeAspect="1"/>
+          </p:cNvPicPr>
+          <p:nvPr/>
+        </p:nvPicPr>
+        <p:blipFill>
+          <a:blip r:embed="rId2"/>
+          <a:stretch>
+            <a:fillRect/>
+          </a:stretch>
+        </p:blipFill>
+        <p:spPr>
+          <a:xfrm>
+            <a:off x="228600" y="152401"/>
+            <a:ext cx="5033513" cy="2584777"/>
+          </a:xfrm>
+          <a:prstGeom prst="rect">
+            <a:avLst/>
+          </a:prstGeom>
+        </p:spPr>
+      </p:pic>
+      <p:pic>
+        <p:nvPicPr>
+          <p:cNvPr id="5" name="圖片 4"/>
+          <p:cNvPicPr>
+            <a:picLocks noChangeAspect="1"/>
+          </p:cNvPicPr>
+          <p:nvPr/>
+        </p:nvPicPr>
+        <p:blipFill>
+          <a:blip r:embed="rId3"/>
+          <a:stretch>
+            <a:fillRect/>
+          </a:stretch>
+        </p:blipFill>
+        <p:spPr>
+          <a:xfrm>
+            <a:off x="239743" y="2949903"/>
+            <a:ext cx="5086350" cy="2943225"/>
+          </a:xfrm>
+          <a:prstGeom prst="rect">
+            <a:avLst/>
+          </a:prstGeom>
+        </p:spPr>
+      </p:pic>
     </p:spTree>
     <p:extLst>
       <p:ext uri="{BB962C8B-B14F-4D97-AF65-F5344CB8AC3E}">
-        <p14:creationId xmlns:p14="http://schemas.microsoft.com/office/powerpoint/2010/main" val="26378849"/>
+        <p14:creationId xmlns:p14="http://schemas.microsoft.com/office/powerpoint/2010/main" val="4146549290"/>
       </p:ext>
     </p:extLst>
   </p:cSld>
   <p:clrMapOvr>
     <a:masterClrMapping/>
   </p:clrMapOvr>
-  <p:timing>
-    <p:tnLst>
-      <p:par>
-        <p:cTn id="1" dur="indefinite" restart="never" nodeType="tmRoot"/>
-      </p:par>
-    </p:tnLst>
-  </p:timing>
 </p:sld>
 </file>
 
@@ -8159,7 +8233,7 @@
       </p:grpSpPr>
       <p:sp>
         <p:nvSpPr>
-          <p:cNvPr id="2" name="標題 1"/>
+          <p:cNvPr id="6" name="標題 5"/>
           <p:cNvSpPr>
             <a:spLocks noGrp="1"/>
           </p:cNvSpPr>
@@ -8172,219 +8246,114 @@
           <a:bodyPr/>
           <a:lstStyle/>
           <a:p>
-            <a:r>
-              <a:rPr lang="en-US" altLang="zh-TW" dirty="0" smtClean="0"/>
-              <a:t>Noise stuff</a:t>
-            </a:r>
-            <a:endParaRPr lang="zh-TW" altLang="en-US" dirty="0"/>
-          </a:p>
-        </p:txBody>
-      </p:sp>
-      <p:sp>
-        <p:nvSpPr>
-          <p:cNvPr id="3" name="內容版面配置區 2"/>
-          <p:cNvSpPr>
-            <a:spLocks noGrp="1"/>
-          </p:cNvSpPr>
-          <p:nvPr>
-            <p:ph idx="1"/>
-          </p:nvPr>
-        </p:nvSpPr>
-        <p:spPr/>
-        <p:txBody>
-          <a:bodyPr>
-            <a:normAutofit fontScale="77500" lnSpcReduction="20000"/>
-          </a:bodyPr>
-          <a:lstStyle/>
-          <a:p>
-            <a:r>
-              <a:rPr lang="en-US" altLang="zh-TW" dirty="0">
-                <a:hlinkClick r:id="rId2"/>
-              </a:rPr>
-              <a:t>http://</a:t>
-            </a:r>
-            <a:r>
-              <a:rPr lang="en-US" altLang="zh-TW" dirty="0" smtClean="0">
-                <a:hlinkClick r:id="rId2"/>
-              </a:rPr>
-              <a:t>www.clicktorelease.com/blog/experiments-with-perlin-noise</a:t>
-            </a:r>
-            <a:endParaRPr lang="en-US" altLang="zh-TW" dirty="0" smtClean="0"/>
-          </a:p>
-          <a:p>
-            <a:r>
-              <a:rPr lang="en-US" altLang="zh-TW" dirty="0" err="1" smtClean="0"/>
-              <a:t>Ashima</a:t>
-            </a:r>
-            <a:r>
-              <a:rPr lang="en-US" altLang="zh-TW" dirty="0" smtClean="0"/>
-              <a:t> noise (follows simplex noise)</a:t>
-            </a:r>
-          </a:p>
-          <a:p>
-            <a:pPr marL="457200" lvl="1" indent="0">
-              <a:buNone/>
-            </a:pPr>
-            <a:r>
-              <a:rPr lang="en-US" altLang="zh-TW" dirty="0" smtClean="0">
-                <a:hlinkClick r:id="rId3"/>
-              </a:rPr>
-              <a:t>http</a:t>
-            </a:r>
-            <a:r>
-              <a:rPr lang="en-US" altLang="zh-TW" dirty="0">
-                <a:hlinkClick r:id="rId3"/>
-              </a:rPr>
-              <a:t>://</a:t>
-            </a:r>
-            <a:r>
-              <a:rPr lang="en-US" altLang="zh-TW" dirty="0" smtClean="0">
-                <a:hlinkClick r:id="rId3"/>
-              </a:rPr>
-              <a:t>alteredqualia.com/three/examples/webgl_terrain_dynamic.html</a:t>
-            </a:r>
-            <a:r>
-              <a:rPr lang="en-US" altLang="zh-TW" dirty="0" smtClean="0"/>
-              <a:t> (already in </a:t>
-            </a:r>
-            <a:r>
-              <a:rPr lang="en-US" altLang="zh-TW" dirty="0" err="1" smtClean="0"/>
-              <a:t>shaderLib</a:t>
-            </a:r>
-            <a:r>
-              <a:rPr lang="en-US" altLang="zh-TW" dirty="0" smtClean="0"/>
-              <a:t>)</a:t>
-            </a:r>
-          </a:p>
-          <a:p>
-            <a:pPr marL="457200" lvl="1" indent="0">
-              <a:buNone/>
-            </a:pPr>
-            <a:r>
-              <a:rPr lang="en-US" altLang="zh-TW" dirty="0">
-                <a:hlinkClick r:id="rId4"/>
-              </a:rPr>
-              <a:t>https://</a:t>
-            </a:r>
-            <a:r>
-              <a:rPr lang="en-US" altLang="zh-TW" dirty="0" smtClean="0">
-                <a:hlinkClick r:id="rId4"/>
-              </a:rPr>
-              <a:t>github.com/ashima/webgl-noise/wiki</a:t>
-            </a:r>
-            <a:endParaRPr lang="en-US" altLang="zh-TW" dirty="0" smtClean="0"/>
-          </a:p>
-          <a:p>
-            <a:pPr marL="457200" lvl="1" indent="0">
-              <a:buNone/>
-            </a:pPr>
-            <a:endParaRPr lang="en-US" altLang="zh-TW" dirty="0" smtClean="0"/>
-          </a:p>
-          <a:p>
-            <a:pPr marL="457200" lvl="1" indent="0">
-              <a:buNone/>
-            </a:pPr>
-            <a:endParaRPr lang="en-US" altLang="zh-TW" dirty="0" smtClean="0"/>
-          </a:p>
-          <a:p>
-            <a:r>
-              <a:rPr lang="en-US" altLang="zh-TW" dirty="0">
-                <a:hlinkClick r:id="rId5"/>
-              </a:rPr>
-              <a:t>http://www.clicktorelease.com/blog/vertex-displacement-noise-3d-webgl-glsl-three-js</a:t>
-            </a:r>
-          </a:p>
-          <a:p>
-            <a:r>
-              <a:rPr lang="en-US" altLang="zh-TW" dirty="0" smtClean="0">
-                <a:hlinkClick r:id="rId5"/>
-              </a:rPr>
-              <a:t>http</a:t>
-            </a:r>
-            <a:r>
-              <a:rPr lang="en-US" altLang="zh-TW" dirty="0">
-                <a:hlinkClick r:id="rId5"/>
-              </a:rPr>
-              <a:t>://</a:t>
-            </a:r>
-            <a:r>
-              <a:rPr lang="en-US" altLang="zh-TW" dirty="0" smtClean="0">
-                <a:hlinkClick r:id="rId5"/>
-              </a:rPr>
-              <a:t>grahamweldon.com/posts/view/3d-terrain-generation-with-three-js</a:t>
-            </a:r>
-            <a:r>
-              <a:rPr lang="en-US" altLang="zh-TW" dirty="0" smtClean="0"/>
-              <a:t> (error)</a:t>
-            </a:r>
-          </a:p>
-          <a:p>
-            <a:r>
-              <a:rPr lang="en-US" altLang="zh-TW" dirty="0">
-                <a:hlinkClick r:id="rId6"/>
-              </a:rPr>
-              <a:t>http://</a:t>
-            </a:r>
-            <a:r>
-              <a:rPr lang="en-US" altLang="zh-TW" dirty="0" smtClean="0">
-                <a:hlinkClick r:id="rId6"/>
-              </a:rPr>
-              <a:t>jsperf.com/simplex-noise-comparison</a:t>
-            </a:r>
-            <a:r>
-              <a:rPr lang="en-US" altLang="zh-TW" dirty="0" smtClean="0"/>
-              <a:t> (error)</a:t>
-            </a:r>
-          </a:p>
-          <a:p>
-            <a:r>
-              <a:rPr lang="en-US" altLang="zh-TW" dirty="0" smtClean="0"/>
-              <a:t>Course with </a:t>
-            </a:r>
-            <a:r>
-              <a:rPr lang="en-US" altLang="zh-TW" dirty="0" err="1" smtClean="0"/>
-              <a:t>threejs</a:t>
-            </a:r>
-            <a:r>
-              <a:rPr lang="en-US" altLang="zh-TW" dirty="0"/>
-              <a:t>: </a:t>
-            </a:r>
-            <a:r>
-              <a:rPr lang="en-US" altLang="zh-TW" dirty="0">
-                <a:hlinkClick r:id="rId7"/>
-              </a:rPr>
-              <a:t>http://math.hws.edu/eck/cs424</a:t>
-            </a:r>
-            <a:r>
-              <a:rPr lang="en-US" altLang="zh-TW" dirty="0" smtClean="0">
-                <a:hlinkClick r:id="rId7"/>
-              </a:rPr>
-              <a:t>/</a:t>
-            </a:r>
-            <a:endParaRPr lang="en-US" altLang="zh-TW" dirty="0" smtClean="0"/>
-          </a:p>
-          <a:p>
-            <a:endParaRPr lang="zh-TW" altLang="en-US" dirty="0"/>
+            <a:endParaRPr lang="zh-TW" altLang="en-US"/>
+          </a:p>
+        </p:txBody>
+      </p:sp>
+      <p:pic>
+        <p:nvPicPr>
+          <p:cNvPr id="4" name="圖片 3"/>
+          <p:cNvPicPr>
+            <a:picLocks noChangeAspect="1"/>
+          </p:cNvPicPr>
+          <p:nvPr/>
+        </p:nvPicPr>
+        <p:blipFill>
+          <a:blip r:embed="rId2"/>
+          <a:stretch>
+            <a:fillRect/>
+          </a:stretch>
+        </p:blipFill>
+        <p:spPr>
+          <a:xfrm>
+            <a:off x="323850" y="1946096"/>
+            <a:ext cx="8820150" cy="523875"/>
+          </a:xfrm>
+          <a:prstGeom prst="rect">
+            <a:avLst/>
+          </a:prstGeom>
+        </p:spPr>
+      </p:pic>
+      <p:pic>
+        <p:nvPicPr>
+          <p:cNvPr id="5" name="圖片 4"/>
+          <p:cNvPicPr>
+            <a:picLocks noChangeAspect="1"/>
+          </p:cNvPicPr>
+          <p:nvPr/>
+        </p:nvPicPr>
+        <p:blipFill>
+          <a:blip r:embed="rId3"/>
+          <a:stretch>
+            <a:fillRect/>
+          </a:stretch>
+        </p:blipFill>
+        <p:spPr>
+          <a:xfrm>
+            <a:off x="323850" y="2916747"/>
+            <a:ext cx="6096000" cy="2238375"/>
+          </a:xfrm>
+          <a:prstGeom prst="rect">
+            <a:avLst/>
+          </a:prstGeom>
+        </p:spPr>
+      </p:pic>
+      <p:sp>
+        <p:nvSpPr>
+          <p:cNvPr id="7" name="圓角矩形 6"/>
+          <p:cNvSpPr/>
+          <p:nvPr/>
+        </p:nvSpPr>
+        <p:spPr>
+          <a:xfrm>
+            <a:off x="628650" y="3433313"/>
+            <a:ext cx="898225" cy="276045"/>
+          </a:xfrm>
+          <a:prstGeom prst="roundRect">
+            <a:avLst/>
+          </a:prstGeom>
+          <a:noFill/>
+          <a:ln w="38100">
+            <a:solidFill>
+              <a:srgbClr val="FF0000"/>
+            </a:solidFill>
+          </a:ln>
+        </p:spPr>
+        <p:style>
+          <a:lnRef idx="2">
+            <a:schemeClr val="accent1">
+              <a:shade val="50000"/>
+            </a:schemeClr>
+          </a:lnRef>
+          <a:fillRef idx="1">
+            <a:schemeClr val="accent1"/>
+          </a:fillRef>
+          <a:effectRef idx="0">
+            <a:schemeClr val="accent1"/>
+          </a:effectRef>
+          <a:fontRef idx="minor">
+            <a:schemeClr val="lt1"/>
+          </a:fontRef>
+        </p:style>
+        <p:txBody>
+          <a:bodyPr rtlCol="0" anchor="ctr"/>
+          <a:lstStyle/>
+          <a:p>
+            <a:pPr algn="ctr"/>
+            <a:endParaRPr lang="zh-TW" altLang="en-US"/>
           </a:p>
         </p:txBody>
       </p:sp>
     </p:spTree>
     <p:extLst>
       <p:ext uri="{BB962C8B-B14F-4D97-AF65-F5344CB8AC3E}">
-        <p14:creationId xmlns:p14="http://schemas.microsoft.com/office/powerpoint/2010/main" val="668579239"/>
+        <p14:creationId xmlns:p14="http://schemas.microsoft.com/office/powerpoint/2010/main" val="1710384037"/>
       </p:ext>
     </p:extLst>
   </p:cSld>
   <p:clrMapOvr>
     <a:masterClrMapping/>
   </p:clrMapOvr>
-  <p:timing>
-    <p:tnLst>
-      <p:par>
-        <p:cTn id="1" dur="indefinite" restart="never" nodeType="tmRoot"/>
-      </p:par>
-    </p:tnLst>
-  </p:timing>
 </p:sld>
 </file>
 
@@ -8417,92 +8386,70 @@
         </p:nvSpPr>
         <p:spPr/>
         <p:txBody>
-          <a:bodyPr>
-            <a:normAutofit fontScale="90000"/>
-          </a:bodyPr>
-          <a:lstStyle/>
-          <a:p>
-            <a:r>
-              <a:rPr lang="en-US" altLang="zh-TW" dirty="0">
-                <a:hlinkClick r:id="rId2"/>
-              </a:rPr>
-              <a:t>http://</a:t>
-            </a:r>
+          <a:bodyPr/>
+          <a:lstStyle/>
+          <a:p>
+            <a:r>
+              <a:rPr lang="en-US" altLang="zh-TW" dirty="0" smtClean="0"/>
+              <a:t>Booking system</a:t>
+            </a:r>
+            <a:endParaRPr lang="zh-TW" altLang="en-US" dirty="0"/>
+          </a:p>
+        </p:txBody>
+      </p:sp>
+      <p:sp>
+        <p:nvSpPr>
+          <p:cNvPr id="3" name="內容版面配置區 2"/>
+          <p:cNvSpPr>
+            <a:spLocks noGrp="1"/>
+          </p:cNvSpPr>
+          <p:nvPr>
+            <p:ph idx="1"/>
+          </p:nvPr>
+        </p:nvSpPr>
+        <p:spPr/>
+        <p:txBody>
+          <a:bodyPr/>
+          <a:lstStyle/>
+          <a:p>
             <a:r>
               <a:rPr lang="en-US" altLang="zh-TW" dirty="0" smtClean="0">
                 <a:hlinkClick r:id="rId2"/>
               </a:rPr>
-              <a:t>alteredqualia.com/three/examples/webgl_shader_slime.html</a:t>
-            </a:r>
-            <a:r>
-              <a:rPr lang="en-US" altLang="zh-TW" dirty="0" smtClean="0"/>
-              <a:t/>
-            </a:r>
-            <a:br>
-              <a:rPr lang="en-US" altLang="zh-TW" dirty="0" smtClean="0"/>
-            </a:br>
+              <a:t>http://jsfiddle.net/caa1211/1fd8dyhs/20/</a:t>
+            </a:r>
+            <a:endParaRPr lang="en-US" altLang="zh-TW" dirty="0" smtClean="0"/>
+          </a:p>
+          <a:p>
+            <a:r>
+              <a:rPr lang="en-US" altLang="zh-TW" dirty="0" smtClean="0">
+                <a:hlinkClick r:id="rId3"/>
+              </a:rPr>
+              <a:t>http</a:t>
+            </a:r>
+            <a:r>
+              <a:rPr lang="en-US" altLang="zh-TW" dirty="0">
+                <a:hlinkClick r:id="rId3"/>
+              </a:rPr>
+              <a:t>://</a:t>
+            </a:r>
+            <a:r>
+              <a:rPr lang="en-US" altLang="zh-TW" dirty="0" smtClean="0">
+                <a:hlinkClick r:id="rId3"/>
+              </a:rPr>
+              <a:t>stackoverflow.com/questions/3107543/what-is-the-symbol-used-for-in-javascript</a:t>
+            </a:r>
+            <a:endParaRPr lang="en-US" altLang="zh-TW" dirty="0" smtClean="0"/>
+          </a:p>
+          <a:p>
             <a:endParaRPr lang="zh-TW" altLang="en-US" dirty="0"/>
           </a:p>
         </p:txBody>
       </p:sp>
-      <p:sp>
-        <p:nvSpPr>
-          <p:cNvPr id="3" name="內容版面配置區 2"/>
-          <p:cNvSpPr>
-            <a:spLocks noGrp="1"/>
-          </p:cNvSpPr>
-          <p:nvPr>
-            <p:ph idx="1"/>
-          </p:nvPr>
-        </p:nvSpPr>
-        <p:spPr/>
-        <p:txBody>
-          <a:bodyPr/>
-          <a:lstStyle/>
-          <a:p>
-            <a:r>
-              <a:rPr lang="en-US" altLang="zh-TW" dirty="0" smtClean="0"/>
-              <a:t>See how this page is done: </a:t>
-            </a:r>
-          </a:p>
-          <a:p>
-            <a:pPr lvl="1"/>
-            <a:r>
-              <a:rPr lang="en-US" altLang="zh-TW" dirty="0" smtClean="0"/>
-              <a:t>Noise stuff; 3D &amp; 4 2D </a:t>
-            </a:r>
-            <a:endParaRPr lang="zh-TW" altLang="en-US" dirty="0"/>
-          </a:p>
-        </p:txBody>
-      </p:sp>
-      <p:pic>
-        <p:nvPicPr>
-          <p:cNvPr id="4" name="圖片 3"/>
-          <p:cNvPicPr>
-            <a:picLocks noChangeAspect="1"/>
-          </p:cNvPicPr>
-          <p:nvPr/>
-        </p:nvPicPr>
-        <p:blipFill>
-          <a:blip r:embed="rId3"/>
-          <a:stretch>
-            <a:fillRect/>
-          </a:stretch>
-        </p:blipFill>
-        <p:spPr>
-          <a:xfrm>
-            <a:off x="471567" y="2596552"/>
-            <a:ext cx="7938917" cy="4007598"/>
-          </a:xfrm>
-          <a:prstGeom prst="rect">
-            <a:avLst/>
-          </a:prstGeom>
-        </p:spPr>
-      </p:pic>
     </p:spTree>
     <p:extLst>
       <p:ext uri="{BB962C8B-B14F-4D97-AF65-F5344CB8AC3E}">
-        <p14:creationId xmlns:p14="http://schemas.microsoft.com/office/powerpoint/2010/main" val="1246626084"/>
+        <p14:creationId xmlns:p14="http://schemas.microsoft.com/office/powerpoint/2010/main" val="26378849"/>
       </p:ext>
     </p:extLst>
   </p:cSld>
@@ -8553,35 +8500,196 @@
           <a:p>
             <a:r>
               <a:rPr lang="en-US" altLang="zh-TW" dirty="0" smtClean="0"/>
-              <a:t>Developing codes using </a:t>
-            </a:r>
+              <a:t>Noise stuff</a:t>
+            </a:r>
+            <a:endParaRPr lang="zh-TW" altLang="en-US" dirty="0"/>
+          </a:p>
+        </p:txBody>
+      </p:sp>
+      <p:sp>
+        <p:nvSpPr>
+          <p:cNvPr id="3" name="內容版面配置區 2"/>
+          <p:cNvSpPr>
+            <a:spLocks noGrp="1"/>
+          </p:cNvSpPr>
+          <p:nvPr>
+            <p:ph idx="1"/>
+          </p:nvPr>
+        </p:nvSpPr>
+        <p:spPr/>
+        <p:txBody>
+          <a:bodyPr>
+            <a:normAutofit fontScale="77500" lnSpcReduction="20000"/>
+          </a:bodyPr>
+          <a:lstStyle/>
+          <a:p>
+            <a:r>
+              <a:rPr lang="en-US" altLang="zh-TW" dirty="0">
+                <a:hlinkClick r:id="rId2"/>
+              </a:rPr>
+              <a:t>http://</a:t>
+            </a:r>
+            <a:r>
+              <a:rPr lang="en-US" altLang="zh-TW" dirty="0" smtClean="0">
+                <a:hlinkClick r:id="rId2"/>
+              </a:rPr>
+              <a:t>www.clicktorelease.com/blog/experiments-with-perlin-noise</a:t>
+            </a:r>
+            <a:endParaRPr lang="en-US" altLang="zh-TW" dirty="0" smtClean="0"/>
+          </a:p>
+          <a:p>
             <a:r>
               <a:rPr lang="en-US" altLang="zh-TW" dirty="0" err="1" smtClean="0"/>
-              <a:t>jsFiddle</a:t>
-            </a:r>
-            <a:endParaRPr lang="zh-TW" altLang="en-US" dirty="0"/>
-          </a:p>
-        </p:txBody>
-      </p:sp>
-      <p:sp>
-        <p:nvSpPr>
-          <p:cNvPr id="3" name="內容版面配置區 2"/>
-          <p:cNvSpPr>
-            <a:spLocks noGrp="1"/>
-          </p:cNvSpPr>
-          <p:nvPr>
-            <p:ph idx="1"/>
-          </p:nvPr>
-        </p:nvSpPr>
-        <p:spPr/>
-        <p:txBody>
-          <a:bodyPr/>
-          <a:lstStyle/>
-          <a:p>
-            <a:r>
-              <a:rPr lang="en-US" altLang="zh-TW" dirty="0" smtClean="0"/>
-              <a:t>Testing pieces of code</a:t>
-            </a:r>
+              <a:t>Ashima</a:t>
+            </a:r>
+            <a:r>
+              <a:rPr lang="en-US" altLang="zh-TW" dirty="0" smtClean="0"/>
+              <a:t> noise (follows simplex noise)</a:t>
+            </a:r>
+          </a:p>
+          <a:p>
+            <a:pPr marL="457200" lvl="1" indent="0">
+              <a:buNone/>
+            </a:pPr>
+            <a:r>
+              <a:rPr lang="en-US" altLang="zh-TW" dirty="0" smtClean="0">
+                <a:hlinkClick r:id="rId3"/>
+              </a:rPr>
+              <a:t>http</a:t>
+            </a:r>
+            <a:r>
+              <a:rPr lang="en-US" altLang="zh-TW" dirty="0">
+                <a:hlinkClick r:id="rId3"/>
+              </a:rPr>
+              <a:t>://</a:t>
+            </a:r>
+            <a:r>
+              <a:rPr lang="en-US" altLang="zh-TW" dirty="0" smtClean="0">
+                <a:hlinkClick r:id="rId3"/>
+              </a:rPr>
+              <a:t>alteredqualia.com/three/examples/webgl_terrain_dynamic.html</a:t>
+            </a:r>
+            <a:r>
+              <a:rPr lang="en-US" altLang="zh-TW" dirty="0" smtClean="0"/>
+              <a:t> (already in </a:t>
+            </a:r>
+            <a:r>
+              <a:rPr lang="en-US" altLang="zh-TW" dirty="0" err="1" smtClean="0"/>
+              <a:t>shaderLib</a:t>
+            </a:r>
+            <a:r>
+              <a:rPr lang="en-US" altLang="zh-TW" dirty="0" smtClean="0"/>
+              <a:t>)</a:t>
+            </a:r>
+          </a:p>
+          <a:p>
+            <a:pPr marL="457200" lvl="1" indent="0">
+              <a:buNone/>
+            </a:pPr>
+            <a:r>
+              <a:rPr lang="en-US" altLang="zh-TW" dirty="0">
+                <a:hlinkClick r:id="rId4"/>
+              </a:rPr>
+              <a:t>https://</a:t>
+            </a:r>
+            <a:r>
+              <a:rPr lang="en-US" altLang="zh-TW" dirty="0" smtClean="0">
+                <a:hlinkClick r:id="rId4"/>
+              </a:rPr>
+              <a:t>github.com/ashima/webgl-noise/wiki</a:t>
+            </a:r>
+            <a:endParaRPr lang="en-US" altLang="zh-TW" dirty="0" smtClean="0"/>
+          </a:p>
+          <a:p>
+            <a:pPr marL="457200" lvl="1" indent="0">
+              <a:buNone/>
+            </a:pPr>
+            <a:endParaRPr lang="en-US" altLang="zh-TW" dirty="0" smtClean="0"/>
+          </a:p>
+          <a:p>
+            <a:pPr marL="457200" lvl="1" indent="0">
+              <a:buNone/>
+            </a:pPr>
+            <a:endParaRPr lang="en-US" altLang="zh-TW" dirty="0" smtClean="0"/>
+          </a:p>
+          <a:p>
+            <a:r>
+              <a:rPr lang="en-US" altLang="zh-TW" dirty="0">
+                <a:hlinkClick r:id="rId5"/>
+              </a:rPr>
+              <a:t>http://www.clicktorelease.com/blog/vertex-displacement-noise-3d-webgl-glsl-three-js</a:t>
+            </a:r>
+          </a:p>
+          <a:p>
+            <a:r>
+              <a:rPr lang="en-US" altLang="zh-TW" dirty="0" smtClean="0">
+                <a:hlinkClick r:id="rId5"/>
+              </a:rPr>
+              <a:t>http</a:t>
+            </a:r>
+            <a:r>
+              <a:rPr lang="en-US" altLang="zh-TW" dirty="0">
+                <a:hlinkClick r:id="rId5"/>
+              </a:rPr>
+              <a:t>://</a:t>
+            </a:r>
+            <a:r>
+              <a:rPr lang="en-US" altLang="zh-TW" dirty="0" smtClean="0">
+                <a:hlinkClick r:id="rId5"/>
+              </a:rPr>
+              <a:t>grahamweldon.com/posts/view/3d-terrain-generation-with-three-js</a:t>
+            </a:r>
+            <a:r>
+              <a:rPr lang="en-US" altLang="zh-TW" dirty="0" smtClean="0"/>
+              <a:t> (error)</a:t>
+            </a:r>
+          </a:p>
+          <a:p>
+            <a:r>
+              <a:rPr lang="en-US" altLang="zh-TW" dirty="0">
+                <a:hlinkClick r:id="rId6"/>
+              </a:rPr>
+              <a:t>http://</a:t>
+            </a:r>
+            <a:r>
+              <a:rPr lang="en-US" altLang="zh-TW" dirty="0" smtClean="0">
+                <a:hlinkClick r:id="rId6"/>
+              </a:rPr>
+              <a:t>jsperf.com/simplex-noise-comparison</a:t>
+            </a:r>
+            <a:r>
+              <a:rPr lang="en-US" altLang="zh-TW" dirty="0" smtClean="0"/>
+              <a:t> (error)</a:t>
+            </a:r>
+          </a:p>
+          <a:p>
+            <a:r>
+              <a:rPr lang="en-US" altLang="zh-TW" dirty="0" smtClean="0"/>
+              <a:t>Course with </a:t>
+            </a:r>
+            <a:r>
+              <a:rPr lang="en-US" altLang="zh-TW" dirty="0" err="1" smtClean="0"/>
+              <a:t>threejs</a:t>
+            </a:r>
+            <a:r>
+              <a:rPr lang="en-US" altLang="zh-TW" dirty="0"/>
+              <a:t>: </a:t>
+            </a:r>
+            <a:r>
+              <a:rPr lang="en-US" altLang="zh-TW" dirty="0">
+                <a:hlinkClick r:id="rId7"/>
+              </a:rPr>
+              <a:t>http://math.hws.edu/eck/cs424</a:t>
+            </a:r>
+            <a:r>
+              <a:rPr lang="en-US" altLang="zh-TW" dirty="0" smtClean="0">
+                <a:hlinkClick r:id="rId7"/>
+              </a:rPr>
+              <a:t>/</a:t>
+            </a:r>
+            <a:endParaRPr lang="en-US" altLang="zh-TW" dirty="0" smtClean="0"/>
+          </a:p>
+          <a:p>
             <a:endParaRPr lang="zh-TW" altLang="en-US" dirty="0"/>
           </a:p>
         </p:txBody>
@@ -8589,7 +8697,138 @@
     </p:spTree>
     <p:extLst>
       <p:ext uri="{BB962C8B-B14F-4D97-AF65-F5344CB8AC3E}">
-        <p14:creationId xmlns:p14="http://schemas.microsoft.com/office/powerpoint/2010/main" val="2607243132"/>
+        <p14:creationId xmlns:p14="http://schemas.microsoft.com/office/powerpoint/2010/main" val="668579239"/>
+      </p:ext>
+    </p:extLst>
+  </p:cSld>
+  <p:clrMapOvr>
+    <a:masterClrMapping/>
+  </p:clrMapOvr>
+  <p:timing>
+    <p:tnLst>
+      <p:par>
+        <p:cTn id="1" dur="indefinite" restart="never" nodeType="tmRoot"/>
+      </p:par>
+    </p:tnLst>
+  </p:timing>
+</p:sld>
+</file>
+
+<file path=ppt/slides/slide49.xml><?xml version="1.0" encoding="utf-8"?>
+<p:sld xmlns:a="http://schemas.openxmlformats.org/drawingml/2006/main" xmlns:r="http://schemas.openxmlformats.org/officeDocument/2006/relationships" xmlns:p="http://schemas.openxmlformats.org/presentationml/2006/main">
+  <p:cSld>
+    <p:spTree>
+      <p:nvGrpSpPr>
+        <p:cNvPr id="1" name=""/>
+        <p:cNvGrpSpPr/>
+        <p:nvPr/>
+      </p:nvGrpSpPr>
+      <p:grpSpPr>
+        <a:xfrm>
+          <a:off x="0" y="0"/>
+          <a:ext cx="0" cy="0"/>
+          <a:chOff x="0" y="0"/>
+          <a:chExt cx="0" cy="0"/>
+        </a:xfrm>
+      </p:grpSpPr>
+      <p:sp>
+        <p:nvSpPr>
+          <p:cNvPr id="2" name="標題 1"/>
+          <p:cNvSpPr>
+            <a:spLocks noGrp="1"/>
+          </p:cNvSpPr>
+          <p:nvPr>
+            <p:ph type="title"/>
+          </p:nvPr>
+        </p:nvSpPr>
+        <p:spPr/>
+        <p:txBody>
+          <a:bodyPr>
+            <a:normAutofit fontScale="90000"/>
+          </a:bodyPr>
+          <a:lstStyle/>
+          <a:p>
+            <a:r>
+              <a:rPr lang="en-US" altLang="zh-TW" dirty="0">
+                <a:hlinkClick r:id="rId2"/>
+              </a:rPr>
+              <a:t>http://</a:t>
+            </a:r>
+            <a:r>
+              <a:rPr lang="en-US" altLang="zh-TW" dirty="0" smtClean="0">
+                <a:hlinkClick r:id="rId2"/>
+              </a:rPr>
+              <a:t>alteredqualia.com/three/examples/webgl_shader_slime.html</a:t>
+            </a:r>
+            <a:r>
+              <a:rPr lang="en-US" altLang="zh-TW" dirty="0" smtClean="0"/>
+              <a:t/>
+            </a:r>
+            <a:br>
+              <a:rPr lang="en-US" altLang="zh-TW" dirty="0" smtClean="0"/>
+            </a:br>
+            <a:endParaRPr lang="zh-TW" altLang="en-US" dirty="0"/>
+          </a:p>
+        </p:txBody>
+      </p:sp>
+      <p:sp>
+        <p:nvSpPr>
+          <p:cNvPr id="3" name="內容版面配置區 2"/>
+          <p:cNvSpPr>
+            <a:spLocks noGrp="1"/>
+          </p:cNvSpPr>
+          <p:nvPr>
+            <p:ph idx="1"/>
+          </p:nvPr>
+        </p:nvSpPr>
+        <p:spPr/>
+        <p:txBody>
+          <a:bodyPr/>
+          <a:lstStyle/>
+          <a:p>
+            <a:r>
+              <a:rPr lang="en-US" altLang="zh-TW" dirty="0" smtClean="0"/>
+              <a:t>See how this page is done: </a:t>
+            </a:r>
+          </a:p>
+          <a:p>
+            <a:pPr lvl="1"/>
+            <a:r>
+              <a:rPr lang="en-US" altLang="zh-TW" dirty="0" smtClean="0"/>
+              <a:t>Noise stuff; 3D &amp; 4 2D </a:t>
+            </a:r>
+            <a:endParaRPr lang="zh-TW" altLang="en-US" dirty="0"/>
+          </a:p>
+        </p:txBody>
+      </p:sp>
+      <p:pic>
+        <p:nvPicPr>
+          <p:cNvPr id="4" name="圖片 3"/>
+          <p:cNvPicPr>
+            <a:picLocks noChangeAspect="1"/>
+          </p:cNvPicPr>
+          <p:nvPr/>
+        </p:nvPicPr>
+        <p:blipFill>
+          <a:blip r:embed="rId3"/>
+          <a:stretch>
+            <a:fillRect/>
+          </a:stretch>
+        </p:blipFill>
+        <p:spPr>
+          <a:xfrm>
+            <a:off x="471567" y="2596552"/>
+            <a:ext cx="7938917" cy="4007598"/>
+          </a:xfrm>
+          <a:prstGeom prst="rect">
+            <a:avLst/>
+          </a:prstGeom>
+        </p:spPr>
+      </p:pic>
+    </p:spTree>
+    <p:extLst>
+      <p:ext uri="{BB962C8B-B14F-4D97-AF65-F5344CB8AC3E}">
+        <p14:creationId xmlns:p14="http://schemas.microsoft.com/office/powerpoint/2010/main" val="1246626084"/>
       </p:ext>
     </p:extLst>
   </p:cSld>
@@ -8782,6 +9021,93 @@
     <p:extLst>
       <p:ext uri="{BB962C8B-B14F-4D97-AF65-F5344CB8AC3E}">
         <p14:creationId xmlns:p14="http://schemas.microsoft.com/office/powerpoint/2010/main" val="1557013645"/>
+      </p:ext>
+    </p:extLst>
+  </p:cSld>
+  <p:clrMapOvr>
+    <a:masterClrMapping/>
+  </p:clrMapOvr>
+  <p:timing>
+    <p:tnLst>
+      <p:par>
+        <p:cTn id="1" dur="indefinite" restart="never" nodeType="tmRoot"/>
+      </p:par>
+    </p:tnLst>
+  </p:timing>
+</p:sld>
+</file>
+
+<file path=ppt/slides/slide50.xml><?xml version="1.0" encoding="utf-8"?>
+<p:sld xmlns:a="http://schemas.openxmlformats.org/drawingml/2006/main" xmlns:r="http://schemas.openxmlformats.org/officeDocument/2006/relationships" xmlns:p="http://schemas.openxmlformats.org/presentationml/2006/main">
+  <p:cSld>
+    <p:spTree>
+      <p:nvGrpSpPr>
+        <p:cNvPr id="1" name=""/>
+        <p:cNvGrpSpPr/>
+        <p:nvPr/>
+      </p:nvGrpSpPr>
+      <p:grpSpPr>
+        <a:xfrm>
+          <a:off x="0" y="0"/>
+          <a:ext cx="0" cy="0"/>
+          <a:chOff x="0" y="0"/>
+          <a:chExt cx="0" cy="0"/>
+        </a:xfrm>
+      </p:grpSpPr>
+      <p:sp>
+        <p:nvSpPr>
+          <p:cNvPr id="2" name="標題 1"/>
+          <p:cNvSpPr>
+            <a:spLocks noGrp="1"/>
+          </p:cNvSpPr>
+          <p:nvPr>
+            <p:ph type="title"/>
+          </p:nvPr>
+        </p:nvSpPr>
+        <p:spPr/>
+        <p:txBody>
+          <a:bodyPr/>
+          <a:lstStyle/>
+          <a:p>
+            <a:r>
+              <a:rPr lang="en-US" altLang="zh-TW" dirty="0" smtClean="0"/>
+              <a:t>Developing codes using </a:t>
+            </a:r>
+            <a:r>
+              <a:rPr lang="en-US" altLang="zh-TW" dirty="0" err="1" smtClean="0"/>
+              <a:t>jsFiddle</a:t>
+            </a:r>
+            <a:endParaRPr lang="zh-TW" altLang="en-US" dirty="0"/>
+          </a:p>
+        </p:txBody>
+      </p:sp>
+      <p:sp>
+        <p:nvSpPr>
+          <p:cNvPr id="3" name="內容版面配置區 2"/>
+          <p:cNvSpPr>
+            <a:spLocks noGrp="1"/>
+          </p:cNvSpPr>
+          <p:nvPr>
+            <p:ph idx="1"/>
+          </p:nvPr>
+        </p:nvSpPr>
+        <p:spPr/>
+        <p:txBody>
+          <a:bodyPr/>
+          <a:lstStyle/>
+          <a:p>
+            <a:r>
+              <a:rPr lang="en-US" altLang="zh-TW" dirty="0" smtClean="0"/>
+              <a:t>Testing pieces of code</a:t>
+            </a:r>
+            <a:endParaRPr lang="zh-TW" altLang="en-US" dirty="0"/>
+          </a:p>
+        </p:txBody>
+      </p:sp>
+    </p:spTree>
+    <p:extLst>
+      <p:ext uri="{BB962C8B-B14F-4D97-AF65-F5344CB8AC3E}">
+        <p14:creationId xmlns:p14="http://schemas.microsoft.com/office/powerpoint/2010/main" val="2607243132"/>
       </p:ext>
     </p:extLst>
   </p:cSld>

</xml_diff>